<commit_message>
added sample chapter page to DDAR-web-mockup
</commit_message>
<xml_diff>
--- a/Web/DDAR-web-mockup.pptx
+++ b/Web/DDAR-web-mockup.pptx
@@ -4,8 +4,12 @@
   <p:sldMasterIdLst>
     <p:sldMasterId id="2147483648" r:id="rId1"/>
   </p:sldMasterIdLst>
+  <p:notesMasterIdLst>
+    <p:notesMasterId r:id="rId4"/>
+  </p:notesMasterIdLst>
   <p:sldIdLst>
     <p:sldId id="257" r:id="rId2"/>
+    <p:sldId id="258" r:id="rId3"/>
   </p:sldIdLst>
   <p:sldSz cx="9144000" cy="6858000" type="screen4x3"/>
   <p:notesSz cx="6858000" cy="9144000"/>
@@ -107,6 +111,448 @@
 </p:presentation>
 </file>
 
+<file path=ppt/notesMasters/notesMaster1.xml><?xml version="1.0" encoding="utf-8"?>
+<p:notesMaster xmlns:a="http://schemas.openxmlformats.org/drawingml/2006/main" xmlns:r="http://schemas.openxmlformats.org/officeDocument/2006/relationships" xmlns:p="http://schemas.openxmlformats.org/presentationml/2006/main">
+  <p:cSld>
+    <p:bg>
+      <p:bgRef idx="1001">
+        <a:schemeClr val="bg1"/>
+      </p:bgRef>
+    </p:bg>
+    <p:spTree>
+      <p:nvGrpSpPr>
+        <p:cNvPr id="1" name=""/>
+        <p:cNvGrpSpPr/>
+        <p:nvPr/>
+      </p:nvGrpSpPr>
+      <p:grpSpPr>
+        <a:xfrm>
+          <a:off x="0" y="0"/>
+          <a:ext cx="0" cy="0"/>
+          <a:chOff x="0" y="0"/>
+          <a:chExt cx="0" cy="0"/>
+        </a:xfrm>
+      </p:grpSpPr>
+      <p:sp>
+        <p:nvSpPr>
+          <p:cNvPr id="2" name="Header Placeholder 1"/>
+          <p:cNvSpPr>
+            <a:spLocks noGrp="1"/>
+          </p:cNvSpPr>
+          <p:nvPr>
+            <p:ph type="hdr" sz="quarter"/>
+          </p:nvPr>
+        </p:nvSpPr>
+        <p:spPr>
+          <a:xfrm>
+            <a:off x="0" y="0"/>
+            <a:ext cx="2971800" cy="457200"/>
+          </a:xfrm>
+          <a:prstGeom prst="rect">
+            <a:avLst/>
+          </a:prstGeom>
+        </p:spPr>
+        <p:txBody>
+          <a:bodyPr vert="horz" lIns="91440" tIns="45720" rIns="91440" bIns="45720" rtlCol="0"/>
+          <a:lstStyle>
+            <a:lvl1pPr algn="l">
+              <a:defRPr sz="1200"/>
+            </a:lvl1pPr>
+          </a:lstStyle>
+          <a:p>
+            <a:endParaRPr lang="en-US"/>
+          </a:p>
+        </p:txBody>
+      </p:sp>
+      <p:sp>
+        <p:nvSpPr>
+          <p:cNvPr id="3" name="Date Placeholder 2"/>
+          <p:cNvSpPr>
+            <a:spLocks noGrp="1"/>
+          </p:cNvSpPr>
+          <p:nvPr>
+            <p:ph type="dt" idx="1"/>
+          </p:nvPr>
+        </p:nvSpPr>
+        <p:spPr>
+          <a:xfrm>
+            <a:off x="3884613" y="0"/>
+            <a:ext cx="2971800" cy="457200"/>
+          </a:xfrm>
+          <a:prstGeom prst="rect">
+            <a:avLst/>
+          </a:prstGeom>
+        </p:spPr>
+        <p:txBody>
+          <a:bodyPr vert="horz" lIns="91440" tIns="45720" rIns="91440" bIns="45720" rtlCol="0"/>
+          <a:lstStyle>
+            <a:lvl1pPr algn="r">
+              <a:defRPr sz="1200"/>
+            </a:lvl1pPr>
+          </a:lstStyle>
+          <a:p>
+            <a:fld id="{C944B16E-4EF5-4DC5-9962-D87D5B3E9C14}" type="datetimeFigureOut">
+              <a:rPr lang="en-US" smtClean="0"/>
+              <a:t>11/25/2015</a:t>
+            </a:fld>
+            <a:endParaRPr lang="en-US"/>
+          </a:p>
+        </p:txBody>
+      </p:sp>
+      <p:sp>
+        <p:nvSpPr>
+          <p:cNvPr id="4" name="Slide Image Placeholder 3"/>
+          <p:cNvSpPr>
+            <a:spLocks noGrp="1" noRot="1" noChangeAspect="1"/>
+          </p:cNvSpPr>
+          <p:nvPr>
+            <p:ph type="sldImg" idx="2"/>
+          </p:nvPr>
+        </p:nvSpPr>
+        <p:spPr>
+          <a:xfrm>
+            <a:off x="1143000" y="685800"/>
+            <a:ext cx="4572000" cy="3429000"/>
+          </a:xfrm>
+          <a:prstGeom prst="rect">
+            <a:avLst/>
+          </a:prstGeom>
+          <a:noFill/>
+          <a:ln w="12700">
+            <a:solidFill>
+              <a:prstClr val="black"/>
+            </a:solidFill>
+          </a:ln>
+        </p:spPr>
+        <p:txBody>
+          <a:bodyPr vert="horz" lIns="91440" tIns="45720" rIns="91440" bIns="45720" rtlCol="0" anchor="ctr"/>
+          <a:lstStyle/>
+          <a:p>
+            <a:endParaRPr lang="en-US"/>
+          </a:p>
+        </p:txBody>
+      </p:sp>
+      <p:sp>
+        <p:nvSpPr>
+          <p:cNvPr id="5" name="Notes Placeholder 4"/>
+          <p:cNvSpPr>
+            <a:spLocks noGrp="1"/>
+          </p:cNvSpPr>
+          <p:nvPr>
+            <p:ph type="body" sz="quarter" idx="3"/>
+          </p:nvPr>
+        </p:nvSpPr>
+        <p:spPr>
+          <a:xfrm>
+            <a:off x="685800" y="4343400"/>
+            <a:ext cx="5486400" cy="4114800"/>
+          </a:xfrm>
+          <a:prstGeom prst="rect">
+            <a:avLst/>
+          </a:prstGeom>
+        </p:spPr>
+        <p:txBody>
+          <a:bodyPr vert="horz" lIns="91440" tIns="45720" rIns="91440" bIns="45720" rtlCol="0"/>
+          <a:lstStyle/>
+          <a:p>
+            <a:pPr lvl="0"/>
+            <a:r>
+              <a:rPr lang="en-US" smtClean="0"/>
+              <a:t>Click to edit Master text styles</a:t>
+            </a:r>
+          </a:p>
+          <a:p>
+            <a:pPr lvl="1"/>
+            <a:r>
+              <a:rPr lang="en-US" smtClean="0"/>
+              <a:t>Second level</a:t>
+            </a:r>
+          </a:p>
+          <a:p>
+            <a:pPr lvl="2"/>
+            <a:r>
+              <a:rPr lang="en-US" smtClean="0"/>
+              <a:t>Third level</a:t>
+            </a:r>
+          </a:p>
+          <a:p>
+            <a:pPr lvl="3"/>
+            <a:r>
+              <a:rPr lang="en-US" smtClean="0"/>
+              <a:t>Fourth level</a:t>
+            </a:r>
+          </a:p>
+          <a:p>
+            <a:pPr lvl="4"/>
+            <a:r>
+              <a:rPr lang="en-US" smtClean="0"/>
+              <a:t>Fifth level</a:t>
+            </a:r>
+            <a:endParaRPr lang="en-US"/>
+          </a:p>
+        </p:txBody>
+      </p:sp>
+      <p:sp>
+        <p:nvSpPr>
+          <p:cNvPr id="6" name="Footer Placeholder 5"/>
+          <p:cNvSpPr>
+            <a:spLocks noGrp="1"/>
+          </p:cNvSpPr>
+          <p:nvPr>
+            <p:ph type="ftr" sz="quarter" idx="4"/>
+          </p:nvPr>
+        </p:nvSpPr>
+        <p:spPr>
+          <a:xfrm>
+            <a:off x="0" y="8685213"/>
+            <a:ext cx="2971800" cy="457200"/>
+          </a:xfrm>
+          <a:prstGeom prst="rect">
+            <a:avLst/>
+          </a:prstGeom>
+        </p:spPr>
+        <p:txBody>
+          <a:bodyPr vert="horz" lIns="91440" tIns="45720" rIns="91440" bIns="45720" rtlCol="0" anchor="b"/>
+          <a:lstStyle>
+            <a:lvl1pPr algn="l">
+              <a:defRPr sz="1200"/>
+            </a:lvl1pPr>
+          </a:lstStyle>
+          <a:p>
+            <a:endParaRPr lang="en-US"/>
+          </a:p>
+        </p:txBody>
+      </p:sp>
+      <p:sp>
+        <p:nvSpPr>
+          <p:cNvPr id="7" name="Slide Number Placeholder 6"/>
+          <p:cNvSpPr>
+            <a:spLocks noGrp="1"/>
+          </p:cNvSpPr>
+          <p:nvPr>
+            <p:ph type="sldNum" sz="quarter" idx="5"/>
+          </p:nvPr>
+        </p:nvSpPr>
+        <p:spPr>
+          <a:xfrm>
+            <a:off x="3884613" y="8685213"/>
+            <a:ext cx="2971800" cy="457200"/>
+          </a:xfrm>
+          <a:prstGeom prst="rect">
+            <a:avLst/>
+          </a:prstGeom>
+        </p:spPr>
+        <p:txBody>
+          <a:bodyPr vert="horz" lIns="91440" tIns="45720" rIns="91440" bIns="45720" rtlCol="0" anchor="b"/>
+          <a:lstStyle>
+            <a:lvl1pPr algn="r">
+              <a:defRPr sz="1200"/>
+            </a:lvl1pPr>
+          </a:lstStyle>
+          <a:p>
+            <a:fld id="{D614BDC9-F683-4A9D-A606-93778204B767}" type="slidenum">
+              <a:rPr lang="en-US" smtClean="0"/>
+              <a:t>‹#›</a:t>
+            </a:fld>
+            <a:endParaRPr lang="en-US"/>
+          </a:p>
+        </p:txBody>
+      </p:sp>
+    </p:spTree>
+    <p:extLst>
+      <p:ext uri="{BB962C8B-B14F-4D97-AF65-F5344CB8AC3E}">
+        <p14:creationId xmlns:p14="http://schemas.microsoft.com/office/powerpoint/2010/main" val="1243623500"/>
+      </p:ext>
+    </p:extLst>
+  </p:cSld>
+  <p:clrMap bg1="lt1" tx1="dk1" bg2="lt2" tx2="dk2" accent1="accent1" accent2="accent2" accent3="accent3" accent4="accent4" accent5="accent5" accent6="accent6" hlink="hlink" folHlink="folHlink"/>
+  <p:notesStyle>
+    <a:lvl1pPr marL="0" algn="l" defTabSz="914400" rtl="0" eaLnBrk="1" latinLnBrk="0" hangingPunct="1">
+      <a:defRPr sz="1200" kern="1200">
+        <a:solidFill>
+          <a:schemeClr val="tx1"/>
+        </a:solidFill>
+        <a:latin typeface="+mn-lt"/>
+        <a:ea typeface="+mn-ea"/>
+        <a:cs typeface="+mn-cs"/>
+      </a:defRPr>
+    </a:lvl1pPr>
+    <a:lvl2pPr marL="457200" algn="l" defTabSz="914400" rtl="0" eaLnBrk="1" latinLnBrk="0" hangingPunct="1">
+      <a:defRPr sz="1200" kern="1200">
+        <a:solidFill>
+          <a:schemeClr val="tx1"/>
+        </a:solidFill>
+        <a:latin typeface="+mn-lt"/>
+        <a:ea typeface="+mn-ea"/>
+        <a:cs typeface="+mn-cs"/>
+      </a:defRPr>
+    </a:lvl2pPr>
+    <a:lvl3pPr marL="914400" algn="l" defTabSz="914400" rtl="0" eaLnBrk="1" latinLnBrk="0" hangingPunct="1">
+      <a:defRPr sz="1200" kern="1200">
+        <a:solidFill>
+          <a:schemeClr val="tx1"/>
+        </a:solidFill>
+        <a:latin typeface="+mn-lt"/>
+        <a:ea typeface="+mn-ea"/>
+        <a:cs typeface="+mn-cs"/>
+      </a:defRPr>
+    </a:lvl3pPr>
+    <a:lvl4pPr marL="1371600" algn="l" defTabSz="914400" rtl="0" eaLnBrk="1" latinLnBrk="0" hangingPunct="1">
+      <a:defRPr sz="1200" kern="1200">
+        <a:solidFill>
+          <a:schemeClr val="tx1"/>
+        </a:solidFill>
+        <a:latin typeface="+mn-lt"/>
+        <a:ea typeface="+mn-ea"/>
+        <a:cs typeface="+mn-cs"/>
+      </a:defRPr>
+    </a:lvl4pPr>
+    <a:lvl5pPr marL="1828800" algn="l" defTabSz="914400" rtl="0" eaLnBrk="1" latinLnBrk="0" hangingPunct="1">
+      <a:defRPr sz="1200" kern="1200">
+        <a:solidFill>
+          <a:schemeClr val="tx1"/>
+        </a:solidFill>
+        <a:latin typeface="+mn-lt"/>
+        <a:ea typeface="+mn-ea"/>
+        <a:cs typeface="+mn-cs"/>
+      </a:defRPr>
+    </a:lvl5pPr>
+    <a:lvl6pPr marL="2286000" algn="l" defTabSz="914400" rtl="0" eaLnBrk="1" latinLnBrk="0" hangingPunct="1">
+      <a:defRPr sz="1200" kern="1200">
+        <a:solidFill>
+          <a:schemeClr val="tx1"/>
+        </a:solidFill>
+        <a:latin typeface="+mn-lt"/>
+        <a:ea typeface="+mn-ea"/>
+        <a:cs typeface="+mn-cs"/>
+      </a:defRPr>
+    </a:lvl6pPr>
+    <a:lvl7pPr marL="2743200" algn="l" defTabSz="914400" rtl="0" eaLnBrk="1" latinLnBrk="0" hangingPunct="1">
+      <a:defRPr sz="1200" kern="1200">
+        <a:solidFill>
+          <a:schemeClr val="tx1"/>
+        </a:solidFill>
+        <a:latin typeface="+mn-lt"/>
+        <a:ea typeface="+mn-ea"/>
+        <a:cs typeface="+mn-cs"/>
+      </a:defRPr>
+    </a:lvl7pPr>
+    <a:lvl8pPr marL="3200400" algn="l" defTabSz="914400" rtl="0" eaLnBrk="1" latinLnBrk="0" hangingPunct="1">
+      <a:defRPr sz="1200" kern="1200">
+        <a:solidFill>
+          <a:schemeClr val="tx1"/>
+        </a:solidFill>
+        <a:latin typeface="+mn-lt"/>
+        <a:ea typeface="+mn-ea"/>
+        <a:cs typeface="+mn-cs"/>
+      </a:defRPr>
+    </a:lvl8pPr>
+    <a:lvl9pPr marL="3657600" algn="l" defTabSz="914400" rtl="0" eaLnBrk="1" latinLnBrk="0" hangingPunct="1">
+      <a:defRPr sz="1200" kern="1200">
+        <a:solidFill>
+          <a:schemeClr val="tx1"/>
+        </a:solidFill>
+        <a:latin typeface="+mn-lt"/>
+        <a:ea typeface="+mn-ea"/>
+        <a:cs typeface="+mn-cs"/>
+      </a:defRPr>
+    </a:lvl9pPr>
+  </p:notesStyle>
+</p:notesMaster>
+</file>
+
+<file path=ppt/notesSlides/notesSlide1.xml><?xml version="1.0" encoding="utf-8"?>
+<p:notes xmlns:a="http://schemas.openxmlformats.org/drawingml/2006/main" xmlns:r="http://schemas.openxmlformats.org/officeDocument/2006/relationships" xmlns:p="http://schemas.openxmlformats.org/presentationml/2006/main">
+  <p:cSld>
+    <p:spTree>
+      <p:nvGrpSpPr>
+        <p:cNvPr id="1" name=""/>
+        <p:cNvGrpSpPr/>
+        <p:nvPr/>
+      </p:nvGrpSpPr>
+      <p:grpSpPr>
+        <a:xfrm>
+          <a:off x="0" y="0"/>
+          <a:ext cx="0" cy="0"/>
+          <a:chOff x="0" y="0"/>
+          <a:chExt cx="0" cy="0"/>
+        </a:xfrm>
+      </p:grpSpPr>
+      <p:sp>
+        <p:nvSpPr>
+          <p:cNvPr id="2" name="Slide Image Placeholder 1"/>
+          <p:cNvSpPr>
+            <a:spLocks noGrp="1" noRot="1" noChangeAspect="1"/>
+          </p:cNvSpPr>
+          <p:nvPr>
+            <p:ph type="sldImg"/>
+          </p:nvPr>
+        </p:nvSpPr>
+        <p:spPr/>
+      </p:sp>
+      <p:sp>
+        <p:nvSpPr>
+          <p:cNvPr id="3" name="Notes Placeholder 2"/>
+          <p:cNvSpPr>
+            <a:spLocks noGrp="1"/>
+          </p:cNvSpPr>
+          <p:nvPr>
+            <p:ph type="body" idx="1"/>
+          </p:nvPr>
+        </p:nvSpPr>
+        <p:spPr/>
+        <p:txBody>
+          <a:bodyPr/>
+          <a:lstStyle/>
+          <a:p>
+            <a:r>
+              <a:rPr lang="en-US" dirty="0" smtClean="0"/>
+              <a:t>Mockup for a </a:t>
+            </a:r>
+            <a:r>
+              <a:rPr lang="en-US" smtClean="0"/>
+              <a:t>chapter page</a:t>
+            </a:r>
+            <a:endParaRPr lang="en-US"/>
+          </a:p>
+        </p:txBody>
+      </p:sp>
+      <p:sp>
+        <p:nvSpPr>
+          <p:cNvPr id="4" name="Slide Number Placeholder 3"/>
+          <p:cNvSpPr>
+            <a:spLocks noGrp="1"/>
+          </p:cNvSpPr>
+          <p:nvPr>
+            <p:ph type="sldNum" sz="quarter" idx="10"/>
+          </p:nvPr>
+        </p:nvSpPr>
+        <p:spPr/>
+        <p:txBody>
+          <a:bodyPr/>
+          <a:lstStyle/>
+          <a:p>
+            <a:fld id="{D614BDC9-F683-4A9D-A606-93778204B767}" type="slidenum">
+              <a:rPr lang="en-US" smtClean="0"/>
+              <a:t>2</a:t>
+            </a:fld>
+            <a:endParaRPr lang="en-US"/>
+          </a:p>
+        </p:txBody>
+      </p:sp>
+    </p:spTree>
+    <p:extLst>
+      <p:ext uri="{BB962C8B-B14F-4D97-AF65-F5344CB8AC3E}">
+        <p14:creationId xmlns:p14="http://schemas.microsoft.com/office/powerpoint/2010/main" val="1821547436"/>
+      </p:ext>
+    </p:extLst>
+  </p:cSld>
+  <p:clrMapOvr>
+    <a:masterClrMapping/>
+  </p:clrMapOvr>
+</p:notes>
+</file>
+
 <file path=ppt/slideLayouts/slideLayout1.xml><?xml version="1.0" encoding="utf-8"?>
 <p:sldLayout xmlns:a="http://schemas.openxmlformats.org/drawingml/2006/main" xmlns:r="http://schemas.openxmlformats.org/officeDocument/2006/relationships" xmlns:p="http://schemas.openxmlformats.org/presentationml/2006/main" type="title" preserve="1">
   <p:cSld name="Title Slide">
@@ -288,7 +734,7 @@
           <a:p>
             <a:fld id="{026BC67E-53B5-4920-A840-80118272A5CC}" type="datetimeFigureOut">
               <a:rPr lang="en-US" smtClean="0"/>
-              <a:t>11/20/2015</a:t>
+              <a:t>11/25/2015</a:t>
             </a:fld>
             <a:endParaRPr lang="en-US"/>
           </a:p>
@@ -458,7 +904,7 @@
           <a:p>
             <a:fld id="{026BC67E-53B5-4920-A840-80118272A5CC}" type="datetimeFigureOut">
               <a:rPr lang="en-US" smtClean="0"/>
-              <a:t>11/20/2015</a:t>
+              <a:t>11/25/2015</a:t>
             </a:fld>
             <a:endParaRPr lang="en-US"/>
           </a:p>
@@ -638,7 +1084,7 @@
           <a:p>
             <a:fld id="{026BC67E-53B5-4920-A840-80118272A5CC}" type="datetimeFigureOut">
               <a:rPr lang="en-US" smtClean="0"/>
-              <a:t>11/20/2015</a:t>
+              <a:t>11/25/2015</a:t>
             </a:fld>
             <a:endParaRPr lang="en-US"/>
           </a:p>
@@ -808,7 +1254,7 @@
           <a:p>
             <a:fld id="{026BC67E-53B5-4920-A840-80118272A5CC}" type="datetimeFigureOut">
               <a:rPr lang="en-US" smtClean="0"/>
-              <a:t>11/20/2015</a:t>
+              <a:t>11/25/2015</a:t>
             </a:fld>
             <a:endParaRPr lang="en-US"/>
           </a:p>
@@ -1054,7 +1500,7 @@
           <a:p>
             <a:fld id="{026BC67E-53B5-4920-A840-80118272A5CC}" type="datetimeFigureOut">
               <a:rPr lang="en-US" smtClean="0"/>
-              <a:t>11/20/2015</a:t>
+              <a:t>11/25/2015</a:t>
             </a:fld>
             <a:endParaRPr lang="en-US"/>
           </a:p>
@@ -1342,7 +1788,7 @@
           <a:p>
             <a:fld id="{026BC67E-53B5-4920-A840-80118272A5CC}" type="datetimeFigureOut">
               <a:rPr lang="en-US" smtClean="0"/>
-              <a:t>11/20/2015</a:t>
+              <a:t>11/25/2015</a:t>
             </a:fld>
             <a:endParaRPr lang="en-US"/>
           </a:p>
@@ -1764,7 +2210,7 @@
           <a:p>
             <a:fld id="{026BC67E-53B5-4920-A840-80118272A5CC}" type="datetimeFigureOut">
               <a:rPr lang="en-US" smtClean="0"/>
-              <a:t>11/20/2015</a:t>
+              <a:t>11/25/2015</a:t>
             </a:fld>
             <a:endParaRPr lang="en-US"/>
           </a:p>
@@ -1882,7 +2328,7 @@
           <a:p>
             <a:fld id="{026BC67E-53B5-4920-A840-80118272A5CC}" type="datetimeFigureOut">
               <a:rPr lang="en-US" smtClean="0"/>
-              <a:t>11/20/2015</a:t>
+              <a:t>11/25/2015</a:t>
             </a:fld>
             <a:endParaRPr lang="en-US"/>
           </a:p>
@@ -1977,7 +2423,7 @@
           <a:p>
             <a:fld id="{026BC67E-53B5-4920-A840-80118272A5CC}" type="datetimeFigureOut">
               <a:rPr lang="en-US" smtClean="0"/>
-              <a:t>11/20/2015</a:t>
+              <a:t>11/25/2015</a:t>
             </a:fld>
             <a:endParaRPr lang="en-US"/>
           </a:p>
@@ -2254,7 +2700,7 @@
           <a:p>
             <a:fld id="{026BC67E-53B5-4920-A840-80118272A5CC}" type="datetimeFigureOut">
               <a:rPr lang="en-US" smtClean="0"/>
-              <a:t>11/20/2015</a:t>
+              <a:t>11/25/2015</a:t>
             </a:fld>
             <a:endParaRPr lang="en-US"/>
           </a:p>
@@ -2507,7 +2953,7 @@
           <a:p>
             <a:fld id="{026BC67E-53B5-4920-A840-80118272A5CC}" type="datetimeFigureOut">
               <a:rPr lang="en-US" smtClean="0"/>
-              <a:t>11/20/2015</a:t>
+              <a:t>11/25/2015</a:t>
             </a:fld>
             <a:endParaRPr lang="en-US"/>
           </a:p>
@@ -2720,7 +3166,7 @@
           <a:p>
             <a:fld id="{026BC67E-53B5-4920-A840-80118272A5CC}" type="datetimeFigureOut">
               <a:rPr lang="en-US" smtClean="0"/>
-              <a:t>11/20/2015</a:t>
+              <a:t>11/25/2015</a:t>
             </a:fld>
             <a:endParaRPr lang="en-US"/>
           </a:p>
@@ -3201,11 +3647,7 @@
             </a:r>
             <a:r>
               <a:rPr lang="en-US" sz="1400" smtClean="0"/>
-              <a:t>&amp; </a:t>
-            </a:r>
-            <a:r>
-              <a:rPr lang="en-US" sz="1400" smtClean="0"/>
-              <a:t>David </a:t>
+              <a:t>&amp; David </a:t>
             </a:r>
             <a:r>
               <a:rPr lang="en-US" sz="1400" dirty="0" smtClean="0"/>
@@ -3387,6 +3829,623 @@
     <p:extLst>
       <p:ext uri="{BB962C8B-B14F-4D97-AF65-F5344CB8AC3E}">
         <p14:creationId xmlns:p14="http://schemas.microsoft.com/office/powerpoint/2010/main" val="2214551016"/>
+      </p:ext>
+    </p:extLst>
+  </p:cSld>
+  <p:clrMapOvr>
+    <a:masterClrMapping/>
+  </p:clrMapOvr>
+  <p:timing>
+    <p:tnLst>
+      <p:par>
+        <p:cTn id="1" dur="indefinite" restart="never" nodeType="tmRoot"/>
+      </p:par>
+    </p:tnLst>
+  </p:timing>
+</p:sld>
+</file>
+
+<file path=ppt/slides/slide2.xml><?xml version="1.0" encoding="utf-8"?>
+<p:sld xmlns:a="http://schemas.openxmlformats.org/drawingml/2006/main" xmlns:r="http://schemas.openxmlformats.org/officeDocument/2006/relationships" xmlns:p="http://schemas.openxmlformats.org/presentationml/2006/main">
+  <p:cSld>
+    <p:spTree>
+      <p:nvGrpSpPr>
+        <p:cNvPr id="1" name=""/>
+        <p:cNvGrpSpPr/>
+        <p:nvPr/>
+      </p:nvGrpSpPr>
+      <p:grpSpPr>
+        <a:xfrm>
+          <a:off x="0" y="0"/>
+          <a:ext cx="0" cy="0"/>
+          <a:chOff x="0" y="0"/>
+          <a:chExt cx="0" cy="0"/>
+        </a:xfrm>
+      </p:grpSpPr>
+      <p:sp>
+        <p:nvSpPr>
+          <p:cNvPr id="2" name="Rectangle 1"/>
+          <p:cNvSpPr/>
+          <p:nvPr/>
+        </p:nvSpPr>
+        <p:spPr>
+          <a:xfrm>
+            <a:off x="685800" y="533400"/>
+            <a:ext cx="7848600" cy="1371600"/>
+          </a:xfrm>
+          <a:prstGeom prst="rect">
+            <a:avLst/>
+          </a:prstGeom>
+          <a:solidFill>
+            <a:schemeClr val="accent1">
+              <a:alpha val="10000"/>
+            </a:schemeClr>
+          </a:solidFill>
+          <a:ln>
+            <a:noFill/>
+          </a:ln>
+        </p:spPr>
+        <p:style>
+          <a:lnRef idx="2">
+            <a:schemeClr val="accent1">
+              <a:shade val="50000"/>
+            </a:schemeClr>
+          </a:lnRef>
+          <a:fillRef idx="1">
+            <a:schemeClr val="accent1"/>
+          </a:fillRef>
+          <a:effectRef idx="0">
+            <a:schemeClr val="accent1"/>
+          </a:effectRef>
+          <a:fontRef idx="minor">
+            <a:schemeClr val="lt1"/>
+          </a:fontRef>
+        </p:style>
+        <p:txBody>
+          <a:bodyPr rtlCol="0" anchor="ctr"/>
+          <a:lstStyle/>
+          <a:p>
+            <a:pPr algn="ctr"/>
+            <a:endParaRPr lang="en-US"/>
+          </a:p>
+        </p:txBody>
+      </p:sp>
+      <p:sp>
+        <p:nvSpPr>
+          <p:cNvPr id="3" name="TextBox 2"/>
+          <p:cNvSpPr txBox="1"/>
+          <p:nvPr/>
+        </p:nvSpPr>
+        <p:spPr>
+          <a:xfrm>
+            <a:off x="838200" y="685800"/>
+            <a:ext cx="3771900" cy="461665"/>
+          </a:xfrm>
+          <a:prstGeom prst="rect">
+            <a:avLst/>
+          </a:prstGeom>
+          <a:noFill/>
+        </p:spPr>
+        <p:txBody>
+          <a:bodyPr wrap="square" rtlCol="0">
+            <a:spAutoFit/>
+          </a:bodyPr>
+          <a:lstStyle/>
+          <a:p>
+            <a:r>
+              <a:rPr lang="en-US" sz="2400" i="1" dirty="0" smtClean="0"/>
+              <a:t>Discrete Data Analysis with R</a:t>
+            </a:r>
+            <a:endParaRPr lang="en-US" sz="2400" i="1" dirty="0"/>
+          </a:p>
+        </p:txBody>
+      </p:sp>
+      <p:sp>
+        <p:nvSpPr>
+          <p:cNvPr id="4" name="TextBox 3"/>
+          <p:cNvSpPr txBox="1"/>
+          <p:nvPr/>
+        </p:nvSpPr>
+        <p:spPr>
+          <a:xfrm>
+            <a:off x="914400" y="1199965"/>
+            <a:ext cx="2743200" cy="307777"/>
+          </a:xfrm>
+          <a:prstGeom prst="rect">
+            <a:avLst/>
+          </a:prstGeom>
+          <a:noFill/>
+        </p:spPr>
+        <p:txBody>
+          <a:bodyPr wrap="square" rtlCol="0">
+            <a:spAutoFit/>
+          </a:bodyPr>
+          <a:lstStyle/>
+          <a:p>
+            <a:r>
+              <a:rPr lang="en-US" sz="1400" dirty="0" smtClean="0"/>
+              <a:t>Michael Friendly </a:t>
+            </a:r>
+            <a:r>
+              <a:rPr lang="en-US" sz="1400" smtClean="0"/>
+              <a:t>&amp; David </a:t>
+            </a:r>
+            <a:r>
+              <a:rPr lang="en-US" sz="1400" dirty="0" smtClean="0"/>
+              <a:t>Meyer</a:t>
+            </a:r>
+            <a:endParaRPr lang="en-US" sz="1400" dirty="0"/>
+          </a:p>
+        </p:txBody>
+      </p:sp>
+      <p:graphicFrame>
+        <p:nvGraphicFramePr>
+          <p:cNvPr id="5" name="Table 4"/>
+          <p:cNvGraphicFramePr>
+            <a:graphicFrameLocks noGrp="1"/>
+          </p:cNvGraphicFramePr>
+          <p:nvPr>
+            <p:extLst>
+              <p:ext uri="{D42A27DB-BD31-4B8C-83A1-F6EECF244321}">
+                <p14:modId xmlns:p14="http://schemas.microsoft.com/office/powerpoint/2010/main" val="3473390689"/>
+              </p:ext>
+            </p:extLst>
+          </p:nvPr>
+        </p:nvGraphicFramePr>
+        <p:xfrm>
+          <a:off x="990600" y="2057400"/>
+          <a:ext cx="7239000" cy="370840"/>
+        </p:xfrm>
+        <a:graphic>
+          <a:graphicData uri="http://schemas.openxmlformats.org/drawingml/2006/table">
+            <a:tbl>
+              <a:tblPr firstRow="1" bandRow="1">
+                <a:tableStyleId>{5C22544A-7EE6-4342-B048-85BDC9FD1C3A}</a:tableStyleId>
+              </a:tblPr>
+              <a:tblGrid>
+                <a:gridCol w="1447800"/>
+                <a:gridCol w="1447800"/>
+                <a:gridCol w="1447800"/>
+                <a:gridCol w="1447800"/>
+                <a:gridCol w="1447800"/>
+              </a:tblGrid>
+              <a:tr h="370840">
+                <a:tc>
+                  <a:txBody>
+                    <a:bodyPr/>
+                    <a:lstStyle/>
+                    <a:p>
+                      <a:r>
+                        <a:rPr lang="en-US" sz="1400" dirty="0" smtClean="0"/>
+                        <a:t>Home</a:t>
+                      </a:r>
+                      <a:endParaRPr lang="en-US" sz="1400" dirty="0"/>
+                    </a:p>
+                  </a:txBody>
+                  <a:tcPr/>
+                </a:tc>
+                <a:tc>
+                  <a:txBody>
+                    <a:bodyPr/>
+                    <a:lstStyle/>
+                    <a:p>
+                      <a:r>
+                        <a:rPr lang="en-US" sz="1400" dirty="0" smtClean="0"/>
+                        <a:t>Content</a:t>
+                      </a:r>
+                      <a:endParaRPr lang="en-US" sz="1400" dirty="0"/>
+                    </a:p>
+                  </a:txBody>
+                  <a:tcPr/>
+                </a:tc>
+                <a:tc>
+                  <a:txBody>
+                    <a:bodyPr/>
+                    <a:lstStyle/>
+                    <a:p>
+                      <a:r>
+                        <a:rPr lang="en-US" sz="1400" dirty="0" smtClean="0"/>
+                        <a:t>Using the book</a:t>
+                      </a:r>
+                      <a:endParaRPr lang="en-US" sz="1400" dirty="0"/>
+                    </a:p>
+                  </a:txBody>
+                  <a:tcPr/>
+                </a:tc>
+                <a:tc>
+                  <a:txBody>
+                    <a:bodyPr/>
+                    <a:lstStyle/>
+                    <a:p>
+                      <a:r>
+                        <a:rPr lang="en-US" sz="1400" dirty="0" smtClean="0"/>
+                        <a:t>Other materials</a:t>
+                      </a:r>
+                      <a:endParaRPr lang="en-US" sz="1400" dirty="0"/>
+                    </a:p>
+                  </a:txBody>
+                  <a:tcPr/>
+                </a:tc>
+                <a:tc>
+                  <a:txBody>
+                    <a:bodyPr/>
+                    <a:lstStyle/>
+                    <a:p>
+                      <a:r>
+                        <a:rPr lang="en-US" sz="1400" dirty="0" smtClean="0"/>
+                        <a:t>Authors</a:t>
+                      </a:r>
+                      <a:endParaRPr lang="en-US" sz="1400" dirty="0"/>
+                    </a:p>
+                  </a:txBody>
+                  <a:tcPr/>
+                </a:tc>
+              </a:tr>
+            </a:tbl>
+          </a:graphicData>
+        </a:graphic>
+      </p:graphicFrame>
+      <p:sp>
+        <p:nvSpPr>
+          <p:cNvPr id="6" name="TextBox 5"/>
+          <p:cNvSpPr txBox="1"/>
+          <p:nvPr/>
+        </p:nvSpPr>
+        <p:spPr>
+          <a:xfrm>
+            <a:off x="6553200" y="1443335"/>
+            <a:ext cx="1981200" cy="461665"/>
+          </a:xfrm>
+          <a:prstGeom prst="rect">
+            <a:avLst/>
+          </a:prstGeom>
+          <a:noFill/>
+        </p:spPr>
+        <p:txBody>
+          <a:bodyPr wrap="square" rtlCol="0">
+            <a:spAutoFit/>
+          </a:bodyPr>
+          <a:lstStyle/>
+          <a:p>
+            <a:pPr algn="r"/>
+            <a:r>
+              <a:rPr lang="en-US" sz="1200" dirty="0" smtClean="0"/>
+              <a:t>(text overlaid on a graphic, images from the book)</a:t>
+            </a:r>
+            <a:endParaRPr lang="en-US" sz="1200" dirty="0"/>
+          </a:p>
+        </p:txBody>
+      </p:sp>
+      <p:sp>
+        <p:nvSpPr>
+          <p:cNvPr id="7" name="TextBox 6"/>
+          <p:cNvSpPr txBox="1"/>
+          <p:nvPr/>
+        </p:nvSpPr>
+        <p:spPr>
+          <a:xfrm>
+            <a:off x="685800" y="2753695"/>
+            <a:ext cx="2590800" cy="369332"/>
+          </a:xfrm>
+          <a:prstGeom prst="rect">
+            <a:avLst/>
+          </a:prstGeom>
+          <a:noFill/>
+        </p:spPr>
+        <p:txBody>
+          <a:bodyPr wrap="square" rtlCol="0">
+            <a:spAutoFit/>
+          </a:bodyPr>
+          <a:lstStyle/>
+          <a:p>
+            <a:r>
+              <a:rPr lang="en-US" dirty="0" smtClean="0"/>
+              <a:t>Chapter XX prelude</a:t>
+            </a:r>
+            <a:endParaRPr lang="en-US" dirty="0"/>
+          </a:p>
+        </p:txBody>
+      </p:sp>
+      <p:sp>
+        <p:nvSpPr>
+          <p:cNvPr id="8" name="TextBox 7"/>
+          <p:cNvSpPr txBox="1"/>
+          <p:nvPr/>
+        </p:nvSpPr>
+        <p:spPr>
+          <a:xfrm>
+            <a:off x="4762500" y="2753695"/>
+            <a:ext cx="3429000" cy="369332"/>
+          </a:xfrm>
+          <a:prstGeom prst="rect">
+            <a:avLst/>
+          </a:prstGeom>
+          <a:noFill/>
+        </p:spPr>
+        <p:txBody>
+          <a:bodyPr wrap="square" rtlCol="0">
+            <a:spAutoFit/>
+          </a:bodyPr>
+          <a:lstStyle/>
+          <a:p>
+            <a:r>
+              <a:rPr lang="en-US" dirty="0" smtClean="0"/>
+              <a:t>Chapter XX contents</a:t>
+            </a:r>
+            <a:endParaRPr lang="en-US" dirty="0"/>
+          </a:p>
+        </p:txBody>
+      </p:sp>
+      <p:sp>
+        <p:nvSpPr>
+          <p:cNvPr id="9" name="Rectangle 8"/>
+          <p:cNvSpPr/>
+          <p:nvPr/>
+        </p:nvSpPr>
+        <p:spPr>
+          <a:xfrm>
+            <a:off x="4724400" y="2753695"/>
+            <a:ext cx="3810000" cy="2885105"/>
+          </a:xfrm>
+          <a:prstGeom prst="rect">
+            <a:avLst/>
+          </a:prstGeom>
+          <a:solidFill>
+            <a:schemeClr val="accent1">
+              <a:alpha val="10000"/>
+            </a:schemeClr>
+          </a:solidFill>
+          <a:ln>
+            <a:noFill/>
+          </a:ln>
+        </p:spPr>
+        <p:style>
+          <a:lnRef idx="2">
+            <a:schemeClr val="accent1">
+              <a:shade val="50000"/>
+            </a:schemeClr>
+          </a:lnRef>
+          <a:fillRef idx="1">
+            <a:schemeClr val="accent1"/>
+          </a:fillRef>
+          <a:effectRef idx="0">
+            <a:schemeClr val="accent1"/>
+          </a:effectRef>
+          <a:fontRef idx="minor">
+            <a:schemeClr val="lt1"/>
+          </a:fontRef>
+        </p:style>
+        <p:txBody>
+          <a:bodyPr rtlCol="0" anchor="ctr"/>
+          <a:lstStyle/>
+          <a:p>
+            <a:pPr algn="ctr"/>
+            <a:endParaRPr lang="en-US"/>
+          </a:p>
+        </p:txBody>
+      </p:sp>
+      <p:sp>
+        <p:nvSpPr>
+          <p:cNvPr id="10" name="Rectangle 9"/>
+          <p:cNvSpPr/>
+          <p:nvPr/>
+        </p:nvSpPr>
+        <p:spPr>
+          <a:xfrm>
+            <a:off x="685800" y="2753695"/>
+            <a:ext cx="3924300" cy="903905"/>
+          </a:xfrm>
+          <a:prstGeom prst="rect">
+            <a:avLst/>
+          </a:prstGeom>
+          <a:solidFill>
+            <a:schemeClr val="accent1">
+              <a:alpha val="10000"/>
+            </a:schemeClr>
+          </a:solidFill>
+          <a:ln>
+            <a:noFill/>
+          </a:ln>
+        </p:spPr>
+        <p:style>
+          <a:lnRef idx="2">
+            <a:schemeClr val="accent1">
+              <a:shade val="50000"/>
+            </a:schemeClr>
+          </a:lnRef>
+          <a:fillRef idx="1">
+            <a:schemeClr val="accent1"/>
+          </a:fillRef>
+          <a:effectRef idx="0">
+            <a:schemeClr val="accent1"/>
+          </a:effectRef>
+          <a:fontRef idx="minor">
+            <a:schemeClr val="lt1"/>
+          </a:fontRef>
+        </p:style>
+        <p:txBody>
+          <a:bodyPr rot="0" spcFirstLastPara="0" vertOverflow="overflow" horzOverflow="overflow" vert="horz" wrap="square" lIns="91440" tIns="45720" rIns="91440" bIns="45720" numCol="1" spcCol="0" rtlCol="0" fromWordArt="0" anchor="ctr" anchorCtr="0" forceAA="0" compatLnSpc="1">
+            <a:prstTxWarp prst="textNoShape">
+              <a:avLst/>
+            </a:prstTxWarp>
+            <a:noAutofit/>
+          </a:bodyPr>
+          <a:lstStyle/>
+          <a:p>
+            <a:pPr algn="ctr"/>
+            <a:endParaRPr lang="en-US"/>
+          </a:p>
+        </p:txBody>
+      </p:sp>
+      <p:sp>
+        <p:nvSpPr>
+          <p:cNvPr id="11" name="Rectangle 10"/>
+          <p:cNvSpPr/>
+          <p:nvPr/>
+        </p:nvSpPr>
+        <p:spPr>
+          <a:xfrm>
+            <a:off x="597732" y="3850286"/>
+            <a:ext cx="1828800" cy="1828800"/>
+          </a:xfrm>
+          <a:prstGeom prst="rect">
+            <a:avLst/>
+          </a:prstGeom>
+          <a:solidFill>
+            <a:schemeClr val="accent1">
+              <a:alpha val="10000"/>
+            </a:schemeClr>
+          </a:solidFill>
+          <a:ln>
+            <a:noFill/>
+          </a:ln>
+        </p:spPr>
+        <p:style>
+          <a:lnRef idx="2">
+            <a:schemeClr val="accent1">
+              <a:shade val="50000"/>
+            </a:schemeClr>
+          </a:lnRef>
+          <a:fillRef idx="1">
+            <a:schemeClr val="accent1"/>
+          </a:fillRef>
+          <a:effectRef idx="0">
+            <a:schemeClr val="accent1"/>
+          </a:effectRef>
+          <a:fontRef idx="minor">
+            <a:schemeClr val="lt1"/>
+          </a:fontRef>
+        </p:style>
+        <p:txBody>
+          <a:bodyPr rot="0" spcFirstLastPara="0" vertOverflow="overflow" horzOverflow="overflow" vert="horz" wrap="square" lIns="91440" tIns="45720" rIns="91440" bIns="45720" numCol="1" spcCol="0" rtlCol="0" fromWordArt="0" anchor="ctr" anchorCtr="0" forceAA="0" compatLnSpc="1">
+            <a:prstTxWarp prst="textNoShape">
+              <a:avLst/>
+            </a:prstTxWarp>
+            <a:noAutofit/>
+          </a:bodyPr>
+          <a:lstStyle/>
+          <a:p>
+            <a:pPr algn="ctr"/>
+            <a:endParaRPr lang="en-US"/>
+          </a:p>
+        </p:txBody>
+      </p:sp>
+      <p:sp>
+        <p:nvSpPr>
+          <p:cNvPr id="12" name="Rectangle 11"/>
+          <p:cNvSpPr/>
+          <p:nvPr/>
+        </p:nvSpPr>
+        <p:spPr>
+          <a:xfrm>
+            <a:off x="2685113" y="3850286"/>
+            <a:ext cx="1828800" cy="1828800"/>
+          </a:xfrm>
+          <a:prstGeom prst="rect">
+            <a:avLst/>
+          </a:prstGeom>
+          <a:solidFill>
+            <a:schemeClr val="accent1">
+              <a:alpha val="10000"/>
+            </a:schemeClr>
+          </a:solidFill>
+          <a:ln>
+            <a:noFill/>
+          </a:ln>
+        </p:spPr>
+        <p:style>
+          <a:lnRef idx="2">
+            <a:schemeClr val="accent1">
+              <a:shade val="50000"/>
+            </a:schemeClr>
+          </a:lnRef>
+          <a:fillRef idx="1">
+            <a:schemeClr val="accent1"/>
+          </a:fillRef>
+          <a:effectRef idx="0">
+            <a:schemeClr val="accent1"/>
+          </a:effectRef>
+          <a:fontRef idx="minor">
+            <a:schemeClr val="lt1"/>
+          </a:fontRef>
+        </p:style>
+        <p:txBody>
+          <a:bodyPr rot="0" spcFirstLastPara="0" vertOverflow="overflow" horzOverflow="overflow" vert="horz" wrap="square" lIns="91440" tIns="45720" rIns="91440" bIns="45720" numCol="1" spcCol="0" rtlCol="0" fromWordArt="0" anchor="ctr" anchorCtr="0" forceAA="0" compatLnSpc="1">
+            <a:prstTxWarp prst="textNoShape">
+              <a:avLst/>
+            </a:prstTxWarp>
+            <a:noAutofit/>
+          </a:bodyPr>
+          <a:lstStyle/>
+          <a:p>
+            <a:pPr algn="ctr"/>
+            <a:endParaRPr lang="en-US"/>
+          </a:p>
+        </p:txBody>
+      </p:sp>
+      <p:sp>
+        <p:nvSpPr>
+          <p:cNvPr id="13" name="TextBox 12"/>
+          <p:cNvSpPr txBox="1"/>
+          <p:nvPr/>
+        </p:nvSpPr>
+        <p:spPr>
+          <a:xfrm>
+            <a:off x="1087098" y="4580020"/>
+            <a:ext cx="850068" cy="369332"/>
+          </a:xfrm>
+          <a:prstGeom prst="rect">
+            <a:avLst/>
+          </a:prstGeom>
+          <a:noFill/>
+        </p:spPr>
+        <p:txBody>
+          <a:bodyPr wrap="square" rtlCol="0">
+            <a:spAutoFit/>
+          </a:bodyPr>
+          <a:lstStyle/>
+          <a:p>
+            <a:r>
+              <a:rPr lang="en-US" dirty="0" smtClean="0"/>
+              <a:t>Image</a:t>
+            </a:r>
+            <a:endParaRPr lang="en-US" dirty="0"/>
+          </a:p>
+        </p:txBody>
+      </p:sp>
+      <p:sp>
+        <p:nvSpPr>
+          <p:cNvPr id="14" name="Rectangle 13"/>
+          <p:cNvSpPr/>
+          <p:nvPr/>
+        </p:nvSpPr>
+        <p:spPr>
+          <a:xfrm>
+            <a:off x="3219601" y="4580020"/>
+            <a:ext cx="759823" cy="369332"/>
+          </a:xfrm>
+          <a:prstGeom prst="rect">
+            <a:avLst/>
+          </a:prstGeom>
+        </p:spPr>
+        <p:txBody>
+          <a:bodyPr wrap="none">
+            <a:spAutoFit/>
+          </a:bodyPr>
+          <a:lstStyle/>
+          <a:p>
+            <a:r>
+              <a:rPr lang="en-US" dirty="0"/>
+              <a:t>Image</a:t>
+            </a:r>
+            <a:endParaRPr lang="en-US" dirty="0"/>
+          </a:p>
+        </p:txBody>
+      </p:sp>
+    </p:spTree>
+    <p:extLst>
+      <p:ext uri="{BB962C8B-B14F-4D97-AF65-F5344CB8AC3E}">
+        <p14:creationId xmlns:p14="http://schemas.microsoft.com/office/powerpoint/2010/main" val="983227491"/>
       </p:ext>
     </p:extLst>
   </p:cSld>
@@ -3683,6 +4742,326 @@
       </a:bgFillStyleLst>
     </a:fmtScheme>
   </a:themeElements>
+  <a:objectDefaults>
+    <a:spDef>
+      <a:spPr>
+        <a:solidFill>
+          <a:schemeClr val="accent1">
+            <a:alpha val="10000"/>
+          </a:schemeClr>
+        </a:solidFill>
+        <a:ln>
+          <a:noFill/>
+        </a:ln>
+      </a:spPr>
+      <a:bodyPr rtlCol="0" anchor="ctr"/>
+      <a:lstStyle>
+        <a:defPPr algn="ctr">
+          <a:defRPr/>
+        </a:defPPr>
+      </a:lstStyle>
+      <a:style>
+        <a:lnRef idx="2">
+          <a:schemeClr val="accent1">
+            <a:shade val="50000"/>
+          </a:schemeClr>
+        </a:lnRef>
+        <a:fillRef idx="1">
+          <a:schemeClr val="accent1"/>
+        </a:fillRef>
+        <a:effectRef idx="0">
+          <a:schemeClr val="accent1"/>
+        </a:effectRef>
+        <a:fontRef idx="minor">
+          <a:schemeClr val="lt1"/>
+        </a:fontRef>
+      </a:style>
+    </a:spDef>
+  </a:objectDefaults>
+  <a:extraClrSchemeLst/>
+</a:theme>
+</file>
+
+<file path=ppt/theme/theme2.xml><?xml version="1.0" encoding="utf-8"?>
+<a:theme xmlns:a="http://schemas.openxmlformats.org/drawingml/2006/main" name="Office Theme">
+  <a:themeElements>
+    <a:clrScheme name="Office">
+      <a:dk1>
+        <a:sysClr val="windowText" lastClr="000000"/>
+      </a:dk1>
+      <a:lt1>
+        <a:sysClr val="window" lastClr="FFFFFF"/>
+      </a:lt1>
+      <a:dk2>
+        <a:srgbClr val="1F497D"/>
+      </a:dk2>
+      <a:lt2>
+        <a:srgbClr val="EEECE1"/>
+      </a:lt2>
+      <a:accent1>
+        <a:srgbClr val="4F81BD"/>
+      </a:accent1>
+      <a:accent2>
+        <a:srgbClr val="C0504D"/>
+      </a:accent2>
+      <a:accent3>
+        <a:srgbClr val="9BBB59"/>
+      </a:accent3>
+      <a:accent4>
+        <a:srgbClr val="8064A2"/>
+      </a:accent4>
+      <a:accent5>
+        <a:srgbClr val="4BACC6"/>
+      </a:accent5>
+      <a:accent6>
+        <a:srgbClr val="F79646"/>
+      </a:accent6>
+      <a:hlink>
+        <a:srgbClr val="0000FF"/>
+      </a:hlink>
+      <a:folHlink>
+        <a:srgbClr val="800080"/>
+      </a:folHlink>
+    </a:clrScheme>
+    <a:fontScheme name="Office">
+      <a:majorFont>
+        <a:latin typeface="Calibri"/>
+        <a:ea typeface=""/>
+        <a:cs typeface=""/>
+        <a:font script="Jpan" typeface="ＭＳ Ｐゴシック"/>
+        <a:font script="Hang" typeface="맑은 고딕"/>
+        <a:font script="Hans" typeface="宋体"/>
+        <a:font script="Hant" typeface="新細明體"/>
+        <a:font script="Arab" typeface="Times New Roman"/>
+        <a:font script="Hebr" typeface="Times New Roman"/>
+        <a:font script="Thai" typeface="Angsana New"/>
+        <a:font script="Ethi" typeface="Nyala"/>
+        <a:font script="Beng" typeface="Vrinda"/>
+        <a:font script="Gujr" typeface="Shruti"/>
+        <a:font script="Khmr" typeface="MoolBoran"/>
+        <a:font script="Knda" typeface="Tunga"/>
+        <a:font script="Guru" typeface="Raavi"/>
+        <a:font script="Cans" typeface="Euphemia"/>
+        <a:font script="Cher" typeface="Plantagenet Cherokee"/>
+        <a:font script="Yiii" typeface="Microsoft Yi Baiti"/>
+        <a:font script="Tibt" typeface="Microsoft Himalaya"/>
+        <a:font script="Thaa" typeface="MV Boli"/>
+        <a:font script="Deva" typeface="Mangal"/>
+        <a:font script="Telu" typeface="Gautami"/>
+        <a:font script="Taml" typeface="Latha"/>
+        <a:font script="Syrc" typeface="Estrangelo Edessa"/>
+        <a:font script="Orya" typeface="Kalinga"/>
+        <a:font script="Mlym" typeface="Kartika"/>
+        <a:font script="Laoo" typeface="DokChampa"/>
+        <a:font script="Sinh" typeface="Iskoola Pota"/>
+        <a:font script="Mong" typeface="Mongolian Baiti"/>
+        <a:font script="Viet" typeface="Times New Roman"/>
+        <a:font script="Uigh" typeface="Microsoft Uighur"/>
+        <a:font script="Geor" typeface="Sylfaen"/>
+      </a:majorFont>
+      <a:minorFont>
+        <a:latin typeface="Calibri"/>
+        <a:ea typeface=""/>
+        <a:cs typeface=""/>
+        <a:font script="Jpan" typeface="ＭＳ Ｐゴシック"/>
+        <a:font script="Hang" typeface="맑은 고딕"/>
+        <a:font script="Hans" typeface="宋体"/>
+        <a:font script="Hant" typeface="新細明體"/>
+        <a:font script="Arab" typeface="Arial"/>
+        <a:font script="Hebr" typeface="Arial"/>
+        <a:font script="Thai" typeface="Cordia New"/>
+        <a:font script="Ethi" typeface="Nyala"/>
+        <a:font script="Beng" typeface="Vrinda"/>
+        <a:font script="Gujr" typeface="Shruti"/>
+        <a:font script="Khmr" typeface="DaunPenh"/>
+        <a:font script="Knda" typeface="Tunga"/>
+        <a:font script="Guru" typeface="Raavi"/>
+        <a:font script="Cans" typeface="Euphemia"/>
+        <a:font script="Cher" typeface="Plantagenet Cherokee"/>
+        <a:font script="Yiii" typeface="Microsoft Yi Baiti"/>
+        <a:font script="Tibt" typeface="Microsoft Himalaya"/>
+        <a:font script="Thaa" typeface="MV Boli"/>
+        <a:font script="Deva" typeface="Mangal"/>
+        <a:font script="Telu" typeface="Gautami"/>
+        <a:font script="Taml" typeface="Latha"/>
+        <a:font script="Syrc" typeface="Estrangelo Edessa"/>
+        <a:font script="Orya" typeface="Kalinga"/>
+        <a:font script="Mlym" typeface="Kartika"/>
+        <a:font script="Laoo" typeface="DokChampa"/>
+        <a:font script="Sinh" typeface="Iskoola Pota"/>
+        <a:font script="Mong" typeface="Mongolian Baiti"/>
+        <a:font script="Viet" typeface="Arial"/>
+        <a:font script="Uigh" typeface="Microsoft Uighur"/>
+        <a:font script="Geor" typeface="Sylfaen"/>
+      </a:minorFont>
+    </a:fontScheme>
+    <a:fmtScheme name="Office">
+      <a:fillStyleLst>
+        <a:solidFill>
+          <a:schemeClr val="phClr"/>
+        </a:solidFill>
+        <a:gradFill rotWithShape="1">
+          <a:gsLst>
+            <a:gs pos="0">
+              <a:schemeClr val="phClr">
+                <a:tint val="50000"/>
+                <a:satMod val="300000"/>
+              </a:schemeClr>
+            </a:gs>
+            <a:gs pos="35000">
+              <a:schemeClr val="phClr">
+                <a:tint val="37000"/>
+                <a:satMod val="300000"/>
+              </a:schemeClr>
+            </a:gs>
+            <a:gs pos="100000">
+              <a:schemeClr val="phClr">
+                <a:tint val="15000"/>
+                <a:satMod val="350000"/>
+              </a:schemeClr>
+            </a:gs>
+          </a:gsLst>
+          <a:lin ang="16200000" scaled="1"/>
+        </a:gradFill>
+        <a:gradFill rotWithShape="1">
+          <a:gsLst>
+            <a:gs pos="0">
+              <a:schemeClr val="phClr">
+                <a:shade val="51000"/>
+                <a:satMod val="130000"/>
+              </a:schemeClr>
+            </a:gs>
+            <a:gs pos="80000">
+              <a:schemeClr val="phClr">
+                <a:shade val="93000"/>
+                <a:satMod val="130000"/>
+              </a:schemeClr>
+            </a:gs>
+            <a:gs pos="100000">
+              <a:schemeClr val="phClr">
+                <a:shade val="94000"/>
+                <a:satMod val="135000"/>
+              </a:schemeClr>
+            </a:gs>
+          </a:gsLst>
+          <a:lin ang="16200000" scaled="0"/>
+        </a:gradFill>
+      </a:fillStyleLst>
+      <a:lnStyleLst>
+        <a:ln w="9525" cap="flat" cmpd="sng" algn="ctr">
+          <a:solidFill>
+            <a:schemeClr val="phClr">
+              <a:shade val="95000"/>
+              <a:satMod val="105000"/>
+            </a:schemeClr>
+          </a:solidFill>
+          <a:prstDash val="solid"/>
+        </a:ln>
+        <a:ln w="25400" cap="flat" cmpd="sng" algn="ctr">
+          <a:solidFill>
+            <a:schemeClr val="phClr"/>
+          </a:solidFill>
+          <a:prstDash val="solid"/>
+        </a:ln>
+        <a:ln w="38100" cap="flat" cmpd="sng" algn="ctr">
+          <a:solidFill>
+            <a:schemeClr val="phClr"/>
+          </a:solidFill>
+          <a:prstDash val="solid"/>
+        </a:ln>
+      </a:lnStyleLst>
+      <a:effectStyleLst>
+        <a:effectStyle>
+          <a:effectLst>
+            <a:outerShdw blurRad="40000" dist="20000" dir="5400000" rotWithShape="0">
+              <a:srgbClr val="000000">
+                <a:alpha val="38000"/>
+              </a:srgbClr>
+            </a:outerShdw>
+          </a:effectLst>
+        </a:effectStyle>
+        <a:effectStyle>
+          <a:effectLst>
+            <a:outerShdw blurRad="40000" dist="23000" dir="5400000" rotWithShape="0">
+              <a:srgbClr val="000000">
+                <a:alpha val="35000"/>
+              </a:srgbClr>
+            </a:outerShdw>
+          </a:effectLst>
+        </a:effectStyle>
+        <a:effectStyle>
+          <a:effectLst>
+            <a:outerShdw blurRad="40000" dist="23000" dir="5400000" rotWithShape="0">
+              <a:srgbClr val="000000">
+                <a:alpha val="35000"/>
+              </a:srgbClr>
+            </a:outerShdw>
+          </a:effectLst>
+          <a:scene3d>
+            <a:camera prst="orthographicFront">
+              <a:rot lat="0" lon="0" rev="0"/>
+            </a:camera>
+            <a:lightRig rig="threePt" dir="t">
+              <a:rot lat="0" lon="0" rev="1200000"/>
+            </a:lightRig>
+          </a:scene3d>
+          <a:sp3d>
+            <a:bevelT w="63500" h="25400"/>
+          </a:sp3d>
+        </a:effectStyle>
+      </a:effectStyleLst>
+      <a:bgFillStyleLst>
+        <a:solidFill>
+          <a:schemeClr val="phClr"/>
+        </a:solidFill>
+        <a:gradFill rotWithShape="1">
+          <a:gsLst>
+            <a:gs pos="0">
+              <a:schemeClr val="phClr">
+                <a:tint val="40000"/>
+                <a:satMod val="350000"/>
+              </a:schemeClr>
+            </a:gs>
+            <a:gs pos="40000">
+              <a:schemeClr val="phClr">
+                <a:tint val="45000"/>
+                <a:shade val="99000"/>
+                <a:satMod val="350000"/>
+              </a:schemeClr>
+            </a:gs>
+            <a:gs pos="100000">
+              <a:schemeClr val="phClr">
+                <a:shade val="20000"/>
+                <a:satMod val="255000"/>
+              </a:schemeClr>
+            </a:gs>
+          </a:gsLst>
+          <a:path path="circle">
+            <a:fillToRect l="50000" t="-80000" r="50000" b="180000"/>
+          </a:path>
+        </a:gradFill>
+        <a:gradFill rotWithShape="1">
+          <a:gsLst>
+            <a:gs pos="0">
+              <a:schemeClr val="phClr">
+                <a:tint val="80000"/>
+                <a:satMod val="300000"/>
+              </a:schemeClr>
+            </a:gs>
+            <a:gs pos="100000">
+              <a:schemeClr val="phClr">
+                <a:shade val="30000"/>
+                <a:satMod val="200000"/>
+              </a:schemeClr>
+            </a:gs>
+          </a:gsLst>
+          <a:path path="circle">
+            <a:fillToRect l="50000" t="50000" r="50000" b="50000"/>
+          </a:path>
+        </a:gradFill>
+      </a:bgFillStyleLst>
+    </a:fmtScheme>
+  </a:themeElements>
   <a:objectDefaults/>
   <a:extraClrSchemeLst/>
 </a:theme>

</xml_diff>

<commit_message>
more work on Web/ stuff
</commit_message>
<xml_diff>
--- a/Web/DDAR-web-mockup.pptx
+++ b/Web/DDAR-web-mockup.pptx
@@ -193,7 +193,7 @@
           <a:p>
             <a:fld id="{C944B16E-4EF5-4DC5-9962-D87D5B3E9C14}" type="datetimeFigureOut">
               <a:rPr lang="en-US" smtClean="0"/>
-              <a:t>11/27/2015</a:t>
+              <a:t>12/7/2015</a:t>
             </a:fld>
             <a:endParaRPr lang="en-US"/>
           </a:p>
@@ -734,7 +734,7 @@
           <a:p>
             <a:fld id="{026BC67E-53B5-4920-A840-80118272A5CC}" type="datetimeFigureOut">
               <a:rPr lang="en-US" smtClean="0"/>
-              <a:t>11/27/2015</a:t>
+              <a:t>12/7/2015</a:t>
             </a:fld>
             <a:endParaRPr lang="en-US"/>
           </a:p>
@@ -904,7 +904,7 @@
           <a:p>
             <a:fld id="{026BC67E-53B5-4920-A840-80118272A5CC}" type="datetimeFigureOut">
               <a:rPr lang="en-US" smtClean="0"/>
-              <a:t>11/27/2015</a:t>
+              <a:t>12/7/2015</a:t>
             </a:fld>
             <a:endParaRPr lang="en-US"/>
           </a:p>
@@ -1084,7 +1084,7 @@
           <a:p>
             <a:fld id="{026BC67E-53B5-4920-A840-80118272A5CC}" type="datetimeFigureOut">
               <a:rPr lang="en-US" smtClean="0"/>
-              <a:t>11/27/2015</a:t>
+              <a:t>12/7/2015</a:t>
             </a:fld>
             <a:endParaRPr lang="en-US"/>
           </a:p>
@@ -1254,7 +1254,7 @@
           <a:p>
             <a:fld id="{026BC67E-53B5-4920-A840-80118272A5CC}" type="datetimeFigureOut">
               <a:rPr lang="en-US" smtClean="0"/>
-              <a:t>11/27/2015</a:t>
+              <a:t>12/7/2015</a:t>
             </a:fld>
             <a:endParaRPr lang="en-US"/>
           </a:p>
@@ -1500,7 +1500,7 @@
           <a:p>
             <a:fld id="{026BC67E-53B5-4920-A840-80118272A5CC}" type="datetimeFigureOut">
               <a:rPr lang="en-US" smtClean="0"/>
-              <a:t>11/27/2015</a:t>
+              <a:t>12/7/2015</a:t>
             </a:fld>
             <a:endParaRPr lang="en-US"/>
           </a:p>
@@ -1788,7 +1788,7 @@
           <a:p>
             <a:fld id="{026BC67E-53B5-4920-A840-80118272A5CC}" type="datetimeFigureOut">
               <a:rPr lang="en-US" smtClean="0"/>
-              <a:t>11/27/2015</a:t>
+              <a:t>12/7/2015</a:t>
             </a:fld>
             <a:endParaRPr lang="en-US"/>
           </a:p>
@@ -2210,7 +2210,7 @@
           <a:p>
             <a:fld id="{026BC67E-53B5-4920-A840-80118272A5CC}" type="datetimeFigureOut">
               <a:rPr lang="en-US" smtClean="0"/>
-              <a:t>11/27/2015</a:t>
+              <a:t>12/7/2015</a:t>
             </a:fld>
             <a:endParaRPr lang="en-US"/>
           </a:p>
@@ -2328,7 +2328,7 @@
           <a:p>
             <a:fld id="{026BC67E-53B5-4920-A840-80118272A5CC}" type="datetimeFigureOut">
               <a:rPr lang="en-US" smtClean="0"/>
-              <a:t>11/27/2015</a:t>
+              <a:t>12/7/2015</a:t>
             </a:fld>
             <a:endParaRPr lang="en-US"/>
           </a:p>
@@ -2423,7 +2423,7 @@
           <a:p>
             <a:fld id="{026BC67E-53B5-4920-A840-80118272A5CC}" type="datetimeFigureOut">
               <a:rPr lang="en-US" smtClean="0"/>
-              <a:t>11/27/2015</a:t>
+              <a:t>12/7/2015</a:t>
             </a:fld>
             <a:endParaRPr lang="en-US"/>
           </a:p>
@@ -2700,7 +2700,7 @@
           <a:p>
             <a:fld id="{026BC67E-53B5-4920-A840-80118272A5CC}" type="datetimeFigureOut">
               <a:rPr lang="en-US" smtClean="0"/>
-              <a:t>11/27/2015</a:t>
+              <a:t>12/7/2015</a:t>
             </a:fld>
             <a:endParaRPr lang="en-US"/>
           </a:p>
@@ -2953,7 +2953,7 @@
           <a:p>
             <a:fld id="{026BC67E-53B5-4920-A840-80118272A5CC}" type="datetimeFigureOut">
               <a:rPr lang="en-US" smtClean="0"/>
-              <a:t>11/27/2015</a:t>
+              <a:t>12/7/2015</a:t>
             </a:fld>
             <a:endParaRPr lang="en-US"/>
           </a:p>
@@ -3166,7 +3166,7 @@
           <a:p>
             <a:fld id="{026BC67E-53B5-4920-A840-80118272A5CC}" type="datetimeFigureOut">
               <a:rPr lang="en-US" smtClean="0"/>
-              <a:t>11/27/2015</a:t>
+              <a:t>12/7/2015</a:t>
             </a:fld>
             <a:endParaRPr lang="en-US"/>
           </a:p>
@@ -4531,6 +4531,39 @@
               <a:t>Other chapter content</a:t>
             </a:r>
             <a:endParaRPr lang="en-US" dirty="0"/>
+          </a:p>
+        </p:txBody>
+      </p:sp>
+      <p:sp>
+        <p:nvSpPr>
+          <p:cNvPr id="16" name="TextBox 15"/>
+          <p:cNvSpPr txBox="1"/>
+          <p:nvPr/>
+        </p:nvSpPr>
+        <p:spPr>
+          <a:xfrm>
+            <a:off x="685800" y="6477000"/>
+            <a:ext cx="7848600" cy="276999"/>
+          </a:xfrm>
+          <a:prstGeom prst="rect">
+            <a:avLst/>
+          </a:prstGeom>
+          <a:solidFill>
+            <a:schemeClr val="accent1">
+              <a:alpha val="10000"/>
+            </a:schemeClr>
+          </a:solidFill>
+        </p:spPr>
+        <p:txBody>
+          <a:bodyPr wrap="square" rtlCol="0">
+            <a:spAutoFit/>
+          </a:bodyPr>
+          <a:lstStyle/>
+          <a:p>
+            <a:r>
+              <a:rPr lang="en-US" sz="1200" dirty="0" smtClean="0"/>
+              <a:t>Page footer</a:t>
+            </a:r>
           </a:p>
         </p:txBody>
       </p:sp>

</xml_diff>

<commit_message>
added some figs to Web/ch03/fig
</commit_message>
<xml_diff>
--- a/Web/DDAR-web-mockup.pptx
+++ b/Web/DDAR-web-mockup.pptx
@@ -5,11 +5,12 @@
     <p:sldMasterId id="2147483648" r:id="rId1"/>
   </p:sldMasterIdLst>
   <p:notesMasterIdLst>
-    <p:notesMasterId r:id="rId4"/>
+    <p:notesMasterId r:id="rId5"/>
   </p:notesMasterIdLst>
   <p:sldIdLst>
     <p:sldId id="257" r:id="rId2"/>
     <p:sldId id="258" r:id="rId3"/>
+    <p:sldId id="259" r:id="rId4"/>
   </p:sldIdLst>
   <p:sldSz cx="9144000" cy="6858000" type="screen4x3"/>
   <p:notesSz cx="6858000" cy="9144000"/>
@@ -193,7 +194,7 @@
           <a:p>
             <a:fld id="{C944B16E-4EF5-4DC5-9962-D87D5B3E9C14}" type="datetimeFigureOut">
               <a:rPr lang="en-US" smtClean="0"/>
-              <a:t>12/7/2015</a:t>
+              <a:t>12/9/2015</a:t>
             </a:fld>
             <a:endParaRPr lang="en-US"/>
           </a:p>
@@ -553,6 +554,98 @@
 </p:notes>
 </file>
 
+<file path=ppt/notesSlides/notesSlide2.xml><?xml version="1.0" encoding="utf-8"?>
+<p:notes xmlns:a="http://schemas.openxmlformats.org/drawingml/2006/main" xmlns:r="http://schemas.openxmlformats.org/officeDocument/2006/relationships" xmlns:p="http://schemas.openxmlformats.org/presentationml/2006/main">
+  <p:cSld>
+    <p:spTree>
+      <p:nvGrpSpPr>
+        <p:cNvPr id="1" name=""/>
+        <p:cNvGrpSpPr/>
+        <p:nvPr/>
+      </p:nvGrpSpPr>
+      <p:grpSpPr>
+        <a:xfrm>
+          <a:off x="0" y="0"/>
+          <a:ext cx="0" cy="0"/>
+          <a:chOff x="0" y="0"/>
+          <a:chExt cx="0" cy="0"/>
+        </a:xfrm>
+      </p:grpSpPr>
+      <p:sp>
+        <p:nvSpPr>
+          <p:cNvPr id="2" name="Slide Image Placeholder 1"/>
+          <p:cNvSpPr>
+            <a:spLocks noGrp="1" noRot="1" noChangeAspect="1"/>
+          </p:cNvSpPr>
+          <p:nvPr>
+            <p:ph type="sldImg"/>
+          </p:nvPr>
+        </p:nvSpPr>
+        <p:spPr/>
+      </p:sp>
+      <p:sp>
+        <p:nvSpPr>
+          <p:cNvPr id="3" name="Notes Placeholder 2"/>
+          <p:cNvSpPr>
+            <a:spLocks noGrp="1"/>
+          </p:cNvSpPr>
+          <p:nvPr>
+            <p:ph type="body" idx="1"/>
+          </p:nvPr>
+        </p:nvSpPr>
+        <p:spPr/>
+        <p:txBody>
+          <a:bodyPr/>
+          <a:lstStyle/>
+          <a:p>
+            <a:r>
+              <a:rPr lang="en-US" smtClean="0"/>
+              <a:t>Alternative mockup </a:t>
+            </a:r>
+            <a:r>
+              <a:rPr lang="en-US" dirty="0" smtClean="0"/>
+              <a:t>for a chapter page</a:t>
+            </a:r>
+            <a:endParaRPr lang="en-US" dirty="0"/>
+          </a:p>
+        </p:txBody>
+      </p:sp>
+      <p:sp>
+        <p:nvSpPr>
+          <p:cNvPr id="4" name="Slide Number Placeholder 3"/>
+          <p:cNvSpPr>
+            <a:spLocks noGrp="1"/>
+          </p:cNvSpPr>
+          <p:nvPr>
+            <p:ph type="sldNum" sz="quarter" idx="10"/>
+          </p:nvPr>
+        </p:nvSpPr>
+        <p:spPr/>
+        <p:txBody>
+          <a:bodyPr/>
+          <a:lstStyle/>
+          <a:p>
+            <a:fld id="{D614BDC9-F683-4A9D-A606-93778204B767}" type="slidenum">
+              <a:rPr lang="en-US" smtClean="0"/>
+              <a:t>3</a:t>
+            </a:fld>
+            <a:endParaRPr lang="en-US"/>
+          </a:p>
+        </p:txBody>
+      </p:sp>
+    </p:spTree>
+    <p:extLst>
+      <p:ext uri="{BB962C8B-B14F-4D97-AF65-F5344CB8AC3E}">
+        <p14:creationId xmlns:p14="http://schemas.microsoft.com/office/powerpoint/2010/main" val="1821547436"/>
+      </p:ext>
+    </p:extLst>
+  </p:cSld>
+  <p:clrMapOvr>
+    <a:masterClrMapping/>
+  </p:clrMapOvr>
+</p:notes>
+</file>
+
 <file path=ppt/slideLayouts/slideLayout1.xml><?xml version="1.0" encoding="utf-8"?>
 <p:sldLayout xmlns:a="http://schemas.openxmlformats.org/drawingml/2006/main" xmlns:r="http://schemas.openxmlformats.org/officeDocument/2006/relationships" xmlns:p="http://schemas.openxmlformats.org/presentationml/2006/main" type="title" preserve="1">
   <p:cSld name="Title Slide">
@@ -734,7 +827,7 @@
           <a:p>
             <a:fld id="{026BC67E-53B5-4920-A840-80118272A5CC}" type="datetimeFigureOut">
               <a:rPr lang="en-US" smtClean="0"/>
-              <a:t>12/7/2015</a:t>
+              <a:t>12/9/2015</a:t>
             </a:fld>
             <a:endParaRPr lang="en-US"/>
           </a:p>
@@ -904,7 +997,7 @@
           <a:p>
             <a:fld id="{026BC67E-53B5-4920-A840-80118272A5CC}" type="datetimeFigureOut">
               <a:rPr lang="en-US" smtClean="0"/>
-              <a:t>12/7/2015</a:t>
+              <a:t>12/9/2015</a:t>
             </a:fld>
             <a:endParaRPr lang="en-US"/>
           </a:p>
@@ -1084,7 +1177,7 @@
           <a:p>
             <a:fld id="{026BC67E-53B5-4920-A840-80118272A5CC}" type="datetimeFigureOut">
               <a:rPr lang="en-US" smtClean="0"/>
-              <a:t>12/7/2015</a:t>
+              <a:t>12/9/2015</a:t>
             </a:fld>
             <a:endParaRPr lang="en-US"/>
           </a:p>
@@ -1254,7 +1347,7 @@
           <a:p>
             <a:fld id="{026BC67E-53B5-4920-A840-80118272A5CC}" type="datetimeFigureOut">
               <a:rPr lang="en-US" smtClean="0"/>
-              <a:t>12/7/2015</a:t>
+              <a:t>12/9/2015</a:t>
             </a:fld>
             <a:endParaRPr lang="en-US"/>
           </a:p>
@@ -1500,7 +1593,7 @@
           <a:p>
             <a:fld id="{026BC67E-53B5-4920-A840-80118272A5CC}" type="datetimeFigureOut">
               <a:rPr lang="en-US" smtClean="0"/>
-              <a:t>12/7/2015</a:t>
+              <a:t>12/9/2015</a:t>
             </a:fld>
             <a:endParaRPr lang="en-US"/>
           </a:p>
@@ -1788,7 +1881,7 @@
           <a:p>
             <a:fld id="{026BC67E-53B5-4920-A840-80118272A5CC}" type="datetimeFigureOut">
               <a:rPr lang="en-US" smtClean="0"/>
-              <a:t>12/7/2015</a:t>
+              <a:t>12/9/2015</a:t>
             </a:fld>
             <a:endParaRPr lang="en-US"/>
           </a:p>
@@ -2210,7 +2303,7 @@
           <a:p>
             <a:fld id="{026BC67E-53B5-4920-A840-80118272A5CC}" type="datetimeFigureOut">
               <a:rPr lang="en-US" smtClean="0"/>
-              <a:t>12/7/2015</a:t>
+              <a:t>12/9/2015</a:t>
             </a:fld>
             <a:endParaRPr lang="en-US"/>
           </a:p>
@@ -2328,7 +2421,7 @@
           <a:p>
             <a:fld id="{026BC67E-53B5-4920-A840-80118272A5CC}" type="datetimeFigureOut">
               <a:rPr lang="en-US" smtClean="0"/>
-              <a:t>12/7/2015</a:t>
+              <a:t>12/9/2015</a:t>
             </a:fld>
             <a:endParaRPr lang="en-US"/>
           </a:p>
@@ -2423,7 +2516,7 @@
           <a:p>
             <a:fld id="{026BC67E-53B5-4920-A840-80118272A5CC}" type="datetimeFigureOut">
               <a:rPr lang="en-US" smtClean="0"/>
-              <a:t>12/7/2015</a:t>
+              <a:t>12/9/2015</a:t>
             </a:fld>
             <a:endParaRPr lang="en-US"/>
           </a:p>
@@ -2700,7 +2793,7 @@
           <a:p>
             <a:fld id="{026BC67E-53B5-4920-A840-80118272A5CC}" type="datetimeFigureOut">
               <a:rPr lang="en-US" smtClean="0"/>
-              <a:t>12/7/2015</a:t>
+              <a:t>12/9/2015</a:t>
             </a:fld>
             <a:endParaRPr lang="en-US"/>
           </a:p>
@@ -2953,7 +3046,7 @@
           <a:p>
             <a:fld id="{026BC67E-53B5-4920-A840-80118272A5CC}" type="datetimeFigureOut">
               <a:rPr lang="en-US" smtClean="0"/>
-              <a:t>12/7/2015</a:t>
+              <a:t>12/9/2015</a:t>
             </a:fld>
             <a:endParaRPr lang="en-US"/>
           </a:p>
@@ -3166,7 +3259,7 @@
           <a:p>
             <a:fld id="{026BC67E-53B5-4920-A840-80118272A5CC}" type="datetimeFigureOut">
               <a:rPr lang="en-US" smtClean="0"/>
-              <a:t>12/7/2015</a:t>
+              <a:t>12/9/2015</a:t>
             </a:fld>
             <a:endParaRPr lang="en-US"/>
           </a:p>
@@ -4179,167 +4272,197 @@
           </a:p>
         </p:txBody>
       </p:sp>
-      <p:sp>
-        <p:nvSpPr>
-          <p:cNvPr id="7" name="TextBox 6"/>
-          <p:cNvSpPr txBox="1"/>
+      <p:grpSp>
+        <p:nvGrpSpPr>
+          <p:cNvPr id="18" name="Group 17"/>
+          <p:cNvGrpSpPr/>
           <p:nvPr/>
-        </p:nvSpPr>
-        <p:spPr>
-          <a:xfrm>
-            <a:off x="685800" y="2753695"/>
-            <a:ext cx="2590800" cy="369332"/>
-          </a:xfrm>
-          <a:prstGeom prst="rect">
-            <a:avLst/>
-          </a:prstGeom>
-          <a:noFill/>
-        </p:spPr>
-        <p:txBody>
-          <a:bodyPr wrap="square" rtlCol="0">
-            <a:spAutoFit/>
-          </a:bodyPr>
-          <a:lstStyle/>
-          <a:p>
-            <a:r>
-              <a:rPr lang="en-US" dirty="0" smtClean="0"/>
-              <a:t>Chapter XX prelude</a:t>
-            </a:r>
-            <a:endParaRPr lang="en-US" dirty="0"/>
-          </a:p>
-        </p:txBody>
-      </p:sp>
-      <p:sp>
-        <p:nvSpPr>
-          <p:cNvPr id="8" name="TextBox 7"/>
-          <p:cNvSpPr txBox="1"/>
-          <p:nvPr/>
-        </p:nvSpPr>
-        <p:spPr>
-          <a:xfrm>
-            <a:off x="4762500" y="2753695"/>
-            <a:ext cx="3429000" cy="369332"/>
-          </a:xfrm>
-          <a:prstGeom prst="rect">
-            <a:avLst/>
-          </a:prstGeom>
-          <a:noFill/>
-        </p:spPr>
-        <p:txBody>
-          <a:bodyPr wrap="square" rtlCol="0">
-            <a:spAutoFit/>
-          </a:bodyPr>
-          <a:lstStyle/>
-          <a:p>
-            <a:r>
-              <a:rPr lang="en-US" dirty="0" smtClean="0"/>
-              <a:t>Chapter XX contents</a:t>
-            </a:r>
-            <a:endParaRPr lang="en-US" dirty="0"/>
-          </a:p>
-        </p:txBody>
-      </p:sp>
-      <p:sp>
-        <p:nvSpPr>
-          <p:cNvPr id="9" name="Rectangle 8"/>
-          <p:cNvSpPr/>
-          <p:nvPr/>
-        </p:nvSpPr>
-        <p:spPr>
+        </p:nvGrpSpPr>
+        <p:grpSpPr>
           <a:xfrm>
             <a:off x="4724400" y="2753695"/>
             <a:ext cx="3810000" cy="2885105"/>
+            <a:chOff x="4724400" y="2753695"/>
+            <a:chExt cx="3810000" cy="2885105"/>
           </a:xfrm>
-          <a:prstGeom prst="rect">
-            <a:avLst/>
-          </a:prstGeom>
-          <a:solidFill>
-            <a:schemeClr val="accent1">
-              <a:alpha val="10000"/>
-            </a:schemeClr>
-          </a:solidFill>
-          <a:ln>
+        </p:grpSpPr>
+        <p:sp>
+          <p:nvSpPr>
+            <p:cNvPr id="8" name="TextBox 7"/>
+            <p:cNvSpPr txBox="1"/>
+            <p:nvPr/>
+          </p:nvSpPr>
+          <p:spPr>
+            <a:xfrm>
+              <a:off x="4762500" y="2753695"/>
+              <a:ext cx="3429000" cy="369332"/>
+            </a:xfrm>
+            <a:prstGeom prst="rect">
+              <a:avLst/>
+            </a:prstGeom>
             <a:noFill/>
-          </a:ln>
-        </p:spPr>
-        <p:style>
-          <a:lnRef idx="2">
-            <a:schemeClr val="accent1">
-              <a:shade val="50000"/>
-            </a:schemeClr>
-          </a:lnRef>
-          <a:fillRef idx="1">
-            <a:schemeClr val="accent1"/>
-          </a:fillRef>
-          <a:effectRef idx="0">
-            <a:schemeClr val="accent1"/>
-          </a:effectRef>
-          <a:fontRef idx="minor">
-            <a:schemeClr val="lt1"/>
-          </a:fontRef>
-        </p:style>
-        <p:txBody>
-          <a:bodyPr rtlCol="0" anchor="ctr"/>
-          <a:lstStyle/>
-          <a:p>
-            <a:pPr algn="ctr"/>
-            <a:endParaRPr lang="en-US"/>
-          </a:p>
-        </p:txBody>
-      </p:sp>
-      <p:sp>
-        <p:nvSpPr>
-          <p:cNvPr id="10" name="Rectangle 9"/>
-          <p:cNvSpPr/>
+          </p:spPr>
+          <p:txBody>
+            <a:bodyPr wrap="square" rtlCol="0">
+              <a:spAutoFit/>
+            </a:bodyPr>
+            <a:lstStyle/>
+            <a:p>
+              <a:r>
+                <a:rPr lang="en-US" dirty="0" smtClean="0"/>
+                <a:t>Chapter XX contents</a:t>
+              </a:r>
+              <a:endParaRPr lang="en-US" dirty="0"/>
+            </a:p>
+          </p:txBody>
+        </p:sp>
+        <p:sp>
+          <p:nvSpPr>
+            <p:cNvPr id="9" name="Rectangle 8"/>
+            <p:cNvSpPr/>
+            <p:nvPr/>
+          </p:nvSpPr>
+          <p:spPr>
+            <a:xfrm>
+              <a:off x="4724400" y="2753695"/>
+              <a:ext cx="3810000" cy="2885105"/>
+            </a:xfrm>
+            <a:prstGeom prst="rect">
+              <a:avLst/>
+            </a:prstGeom>
+            <a:solidFill>
+              <a:schemeClr val="accent1">
+                <a:alpha val="10000"/>
+              </a:schemeClr>
+            </a:solidFill>
+            <a:ln>
+              <a:noFill/>
+            </a:ln>
+          </p:spPr>
+          <p:style>
+            <a:lnRef idx="2">
+              <a:schemeClr val="accent1">
+                <a:shade val="50000"/>
+              </a:schemeClr>
+            </a:lnRef>
+            <a:fillRef idx="1">
+              <a:schemeClr val="accent1"/>
+            </a:fillRef>
+            <a:effectRef idx="0">
+              <a:schemeClr val="accent1"/>
+            </a:effectRef>
+            <a:fontRef idx="minor">
+              <a:schemeClr val="lt1"/>
+            </a:fontRef>
+          </p:style>
+          <p:txBody>
+            <a:bodyPr rtlCol="0" anchor="ctr"/>
+            <a:lstStyle/>
+            <a:p>
+              <a:pPr algn="ctr"/>
+              <a:endParaRPr lang="en-US"/>
+            </a:p>
+          </p:txBody>
+        </p:sp>
+      </p:grpSp>
+      <p:grpSp>
+        <p:nvGrpSpPr>
+          <p:cNvPr id="17" name="Group 16"/>
+          <p:cNvGrpSpPr/>
           <p:nvPr/>
-        </p:nvSpPr>
-        <p:spPr>
+        </p:nvGrpSpPr>
+        <p:grpSpPr>
           <a:xfrm>
             <a:off x="685800" y="2753695"/>
             <a:ext cx="3924300" cy="903905"/>
+            <a:chOff x="685800" y="2753695"/>
+            <a:chExt cx="3924300" cy="903905"/>
           </a:xfrm>
-          <a:prstGeom prst="rect">
-            <a:avLst/>
-          </a:prstGeom>
-          <a:solidFill>
-            <a:schemeClr val="accent1">
-              <a:alpha val="10000"/>
-            </a:schemeClr>
-          </a:solidFill>
-          <a:ln>
+        </p:grpSpPr>
+        <p:sp>
+          <p:nvSpPr>
+            <p:cNvPr id="7" name="TextBox 6"/>
+            <p:cNvSpPr txBox="1"/>
+            <p:nvPr/>
+          </p:nvSpPr>
+          <p:spPr>
+            <a:xfrm>
+              <a:off x="685800" y="2753695"/>
+              <a:ext cx="2590800" cy="369332"/>
+            </a:xfrm>
+            <a:prstGeom prst="rect">
+              <a:avLst/>
+            </a:prstGeom>
             <a:noFill/>
-          </a:ln>
-        </p:spPr>
-        <p:style>
-          <a:lnRef idx="2">
-            <a:schemeClr val="accent1">
-              <a:shade val="50000"/>
-            </a:schemeClr>
-          </a:lnRef>
-          <a:fillRef idx="1">
-            <a:schemeClr val="accent1"/>
-          </a:fillRef>
-          <a:effectRef idx="0">
-            <a:schemeClr val="accent1"/>
-          </a:effectRef>
-          <a:fontRef idx="minor">
-            <a:schemeClr val="lt1"/>
-          </a:fontRef>
-        </p:style>
-        <p:txBody>
-          <a:bodyPr rot="0" spcFirstLastPara="0" vertOverflow="overflow" horzOverflow="overflow" vert="horz" wrap="square" lIns="91440" tIns="45720" rIns="91440" bIns="45720" numCol="1" spcCol="0" rtlCol="0" fromWordArt="0" anchor="ctr" anchorCtr="0" forceAA="0" compatLnSpc="1">
-            <a:prstTxWarp prst="textNoShape">
+          </p:spPr>
+          <p:txBody>
+            <a:bodyPr wrap="square" rtlCol="0">
+              <a:spAutoFit/>
+            </a:bodyPr>
+            <a:lstStyle/>
+            <a:p>
+              <a:r>
+                <a:rPr lang="en-US" dirty="0" smtClean="0"/>
+                <a:t>Chapter XX prelude</a:t>
+              </a:r>
+              <a:endParaRPr lang="en-US" dirty="0"/>
+            </a:p>
+          </p:txBody>
+        </p:sp>
+        <p:sp>
+          <p:nvSpPr>
+            <p:cNvPr id="10" name="Rectangle 9"/>
+            <p:cNvSpPr/>
+            <p:nvPr/>
+          </p:nvSpPr>
+          <p:spPr>
+            <a:xfrm>
+              <a:off x="685800" y="2753695"/>
+              <a:ext cx="3924300" cy="903905"/>
+            </a:xfrm>
+            <a:prstGeom prst="rect">
               <a:avLst/>
-            </a:prstTxWarp>
-            <a:noAutofit/>
-          </a:bodyPr>
-          <a:lstStyle/>
-          <a:p>
-            <a:pPr algn="ctr"/>
-            <a:endParaRPr lang="en-US"/>
-          </a:p>
-        </p:txBody>
-      </p:sp>
+            </a:prstGeom>
+            <a:solidFill>
+              <a:schemeClr val="accent1">
+                <a:alpha val="10000"/>
+              </a:schemeClr>
+            </a:solidFill>
+            <a:ln>
+              <a:noFill/>
+            </a:ln>
+          </p:spPr>
+          <p:style>
+            <a:lnRef idx="2">
+              <a:schemeClr val="accent1">
+                <a:shade val="50000"/>
+              </a:schemeClr>
+            </a:lnRef>
+            <a:fillRef idx="1">
+              <a:schemeClr val="accent1"/>
+            </a:fillRef>
+            <a:effectRef idx="0">
+              <a:schemeClr val="accent1"/>
+            </a:effectRef>
+            <a:fontRef idx="minor">
+              <a:schemeClr val="lt1"/>
+            </a:fontRef>
+          </p:style>
+          <p:txBody>
+            <a:bodyPr rot="0" spcFirstLastPara="0" vertOverflow="overflow" horzOverflow="overflow" vert="horz" wrap="square" lIns="91440" tIns="45720" rIns="91440" bIns="45720" numCol="1" spcCol="0" rtlCol="0" fromWordArt="0" anchor="ctr" anchorCtr="0" forceAA="0" compatLnSpc="1">
+              <a:prstTxWarp prst="textNoShape">
+                <a:avLst/>
+              </a:prstTxWarp>
+              <a:noAutofit/>
+            </a:bodyPr>
+            <a:lstStyle/>
+            <a:p>
+              <a:pPr algn="ctr"/>
+              <a:endParaRPr lang="en-US"/>
+            </a:p>
+          </p:txBody>
+        </p:sp>
+      </p:grpSp>
       <p:sp>
         <p:nvSpPr>
           <p:cNvPr id="11" name="Rectangle 10"/>
@@ -4571,6 +4694,809 @@
     <p:extLst>
       <p:ext uri="{BB962C8B-B14F-4D97-AF65-F5344CB8AC3E}">
         <p14:creationId xmlns:p14="http://schemas.microsoft.com/office/powerpoint/2010/main" val="983227491"/>
+      </p:ext>
+    </p:extLst>
+  </p:cSld>
+  <p:clrMapOvr>
+    <a:masterClrMapping/>
+  </p:clrMapOvr>
+  <p:timing>
+    <p:tnLst>
+      <p:par>
+        <p:cTn id="1" dur="indefinite" restart="never" nodeType="tmRoot"/>
+      </p:par>
+    </p:tnLst>
+  </p:timing>
+</p:sld>
+</file>
+
+<file path=ppt/slides/slide3.xml><?xml version="1.0" encoding="utf-8"?>
+<p:sld xmlns:a="http://schemas.openxmlformats.org/drawingml/2006/main" xmlns:r="http://schemas.openxmlformats.org/officeDocument/2006/relationships" xmlns:p="http://schemas.openxmlformats.org/presentationml/2006/main">
+  <p:cSld>
+    <p:spTree>
+      <p:nvGrpSpPr>
+        <p:cNvPr id="1" name=""/>
+        <p:cNvGrpSpPr/>
+        <p:nvPr/>
+      </p:nvGrpSpPr>
+      <p:grpSpPr>
+        <a:xfrm>
+          <a:off x="0" y="0"/>
+          <a:ext cx="0" cy="0"/>
+          <a:chOff x="0" y="0"/>
+          <a:chExt cx="0" cy="0"/>
+        </a:xfrm>
+      </p:grpSpPr>
+      <p:graphicFrame>
+        <p:nvGraphicFramePr>
+          <p:cNvPr id="5" name="Table 4"/>
+          <p:cNvGraphicFramePr>
+            <a:graphicFrameLocks noGrp="1"/>
+          </p:cNvGraphicFramePr>
+          <p:nvPr>
+            <p:extLst>
+              <p:ext uri="{D42A27DB-BD31-4B8C-83A1-F6EECF244321}">
+                <p14:modId xmlns:p14="http://schemas.microsoft.com/office/powerpoint/2010/main" val="1085115650"/>
+              </p:ext>
+            </p:extLst>
+          </p:nvPr>
+        </p:nvGraphicFramePr>
+        <p:xfrm>
+          <a:off x="990600" y="2057400"/>
+          <a:ext cx="7239000" cy="370840"/>
+        </p:xfrm>
+        <a:graphic>
+          <a:graphicData uri="http://schemas.openxmlformats.org/drawingml/2006/table">
+            <a:tbl>
+              <a:tblPr firstRow="1" bandRow="1">
+                <a:tableStyleId>{5C22544A-7EE6-4342-B048-85BDC9FD1C3A}</a:tableStyleId>
+              </a:tblPr>
+              <a:tblGrid>
+                <a:gridCol w="1447800"/>
+                <a:gridCol w="1447800"/>
+                <a:gridCol w="1447800"/>
+                <a:gridCol w="1447800"/>
+                <a:gridCol w="1447800"/>
+              </a:tblGrid>
+              <a:tr h="370840">
+                <a:tc>
+                  <a:txBody>
+                    <a:bodyPr/>
+                    <a:lstStyle/>
+                    <a:p>
+                      <a:r>
+                        <a:rPr lang="en-US" sz="1400" dirty="0" smtClean="0"/>
+                        <a:t>Home</a:t>
+                      </a:r>
+                      <a:endParaRPr lang="en-US" sz="1400" dirty="0"/>
+                    </a:p>
+                  </a:txBody>
+                  <a:tcPr/>
+                </a:tc>
+                <a:tc>
+                  <a:txBody>
+                    <a:bodyPr/>
+                    <a:lstStyle/>
+                    <a:p>
+                      <a:r>
+                        <a:rPr lang="en-US" sz="1400" dirty="0" smtClean="0"/>
+                        <a:t>Content</a:t>
+                      </a:r>
+                      <a:endParaRPr lang="en-US" sz="1400" dirty="0"/>
+                    </a:p>
+                  </a:txBody>
+                  <a:tcPr/>
+                </a:tc>
+                <a:tc>
+                  <a:txBody>
+                    <a:bodyPr/>
+                    <a:lstStyle/>
+                    <a:p>
+                      <a:r>
+                        <a:rPr lang="en-US" sz="1400" dirty="0" smtClean="0"/>
+                        <a:t>Using the book</a:t>
+                      </a:r>
+                      <a:endParaRPr lang="en-US" sz="1400" dirty="0"/>
+                    </a:p>
+                  </a:txBody>
+                  <a:tcPr/>
+                </a:tc>
+                <a:tc>
+                  <a:txBody>
+                    <a:bodyPr/>
+                    <a:lstStyle/>
+                    <a:p>
+                      <a:r>
+                        <a:rPr lang="en-US" sz="1400" dirty="0" smtClean="0"/>
+                        <a:t>Other materials</a:t>
+                      </a:r>
+                      <a:endParaRPr lang="en-US" sz="1400" dirty="0"/>
+                    </a:p>
+                  </a:txBody>
+                  <a:tcPr/>
+                </a:tc>
+                <a:tc>
+                  <a:txBody>
+                    <a:bodyPr/>
+                    <a:lstStyle/>
+                    <a:p>
+                      <a:r>
+                        <a:rPr lang="en-US" sz="1400" dirty="0" smtClean="0"/>
+                        <a:t>Authors</a:t>
+                      </a:r>
+                      <a:endParaRPr lang="en-US" sz="1400" dirty="0"/>
+                    </a:p>
+                  </a:txBody>
+                  <a:tcPr/>
+                </a:tc>
+              </a:tr>
+            </a:tbl>
+          </a:graphicData>
+        </a:graphic>
+      </p:graphicFrame>
+      <p:sp>
+        <p:nvSpPr>
+          <p:cNvPr id="16" name="TextBox 15"/>
+          <p:cNvSpPr txBox="1"/>
+          <p:nvPr/>
+        </p:nvSpPr>
+        <p:spPr>
+          <a:xfrm>
+            <a:off x="685800" y="6477000"/>
+            <a:ext cx="7848600" cy="276999"/>
+          </a:xfrm>
+          <a:prstGeom prst="rect">
+            <a:avLst/>
+          </a:prstGeom>
+          <a:solidFill>
+            <a:schemeClr val="accent1">
+              <a:alpha val="10000"/>
+            </a:schemeClr>
+          </a:solidFill>
+        </p:spPr>
+        <p:txBody>
+          <a:bodyPr wrap="square" rtlCol="0">
+            <a:spAutoFit/>
+          </a:bodyPr>
+          <a:lstStyle/>
+          <a:p>
+            <a:r>
+              <a:rPr lang="en-US" sz="1200" dirty="0" smtClean="0"/>
+              <a:t>Page footer</a:t>
+            </a:r>
+          </a:p>
+        </p:txBody>
+      </p:sp>
+      <p:pic>
+        <p:nvPicPr>
+          <p:cNvPr id="17" name="Picture 16"/>
+          <p:cNvPicPr>
+            <a:picLocks noChangeAspect="1"/>
+          </p:cNvPicPr>
+          <p:nvPr/>
+        </p:nvPicPr>
+        <p:blipFill>
+          <a:blip r:embed="rId3" cstate="print">
+            <a:extLst>
+              <a:ext uri="{28A0092B-C50C-407E-A947-70E740481C1C}">
+                <a14:useLocalDpi xmlns:a14="http://schemas.microsoft.com/office/drawing/2010/main" val="0"/>
+              </a:ext>
+            </a:extLst>
+          </a:blip>
+          <a:stretch>
+            <a:fillRect/>
+          </a:stretch>
+        </p:blipFill>
+        <p:spPr>
+          <a:xfrm>
+            <a:off x="1485900" y="152400"/>
+            <a:ext cx="6248400" cy="1723484"/>
+          </a:xfrm>
+          <a:prstGeom prst="rect">
+            <a:avLst/>
+          </a:prstGeom>
+        </p:spPr>
+      </p:pic>
+      <p:grpSp>
+        <p:nvGrpSpPr>
+          <p:cNvPr id="33" name="Group 32"/>
+          <p:cNvGrpSpPr/>
+          <p:nvPr/>
+        </p:nvGrpSpPr>
+        <p:grpSpPr>
+          <a:xfrm>
+            <a:off x="705050" y="2667000"/>
+            <a:ext cx="7886700" cy="1600200"/>
+            <a:chOff x="571500" y="2667000"/>
+            <a:chExt cx="8077200" cy="1828800"/>
+          </a:xfrm>
+        </p:grpSpPr>
+        <p:grpSp>
+          <p:nvGrpSpPr>
+            <p:cNvPr id="19" name="Group 18"/>
+            <p:cNvGrpSpPr/>
+            <p:nvPr/>
+          </p:nvGrpSpPr>
+          <p:grpSpPr>
+            <a:xfrm>
+              <a:off x="571500" y="2667000"/>
+              <a:ext cx="1828800" cy="1828800"/>
+              <a:chOff x="571500" y="2667000"/>
+              <a:chExt cx="1828800" cy="1828800"/>
+            </a:xfrm>
+          </p:grpSpPr>
+          <p:sp>
+            <p:nvSpPr>
+              <p:cNvPr id="11" name="Rectangle 10"/>
+              <p:cNvSpPr/>
+              <p:nvPr/>
+            </p:nvSpPr>
+            <p:spPr>
+              <a:xfrm>
+                <a:off x="571500" y="2667000"/>
+                <a:ext cx="1828800" cy="1828800"/>
+              </a:xfrm>
+              <a:prstGeom prst="rect">
+                <a:avLst/>
+              </a:prstGeom>
+              <a:solidFill>
+                <a:schemeClr val="accent1">
+                  <a:alpha val="10000"/>
+                </a:schemeClr>
+              </a:solidFill>
+              <a:ln>
+                <a:noFill/>
+              </a:ln>
+            </p:spPr>
+            <p:style>
+              <a:lnRef idx="2">
+                <a:schemeClr val="accent1">
+                  <a:shade val="50000"/>
+                </a:schemeClr>
+              </a:lnRef>
+              <a:fillRef idx="1">
+                <a:schemeClr val="accent1"/>
+              </a:fillRef>
+              <a:effectRef idx="0">
+                <a:schemeClr val="accent1"/>
+              </a:effectRef>
+              <a:fontRef idx="minor">
+                <a:schemeClr val="lt1"/>
+              </a:fontRef>
+            </p:style>
+            <p:txBody>
+              <a:bodyPr rot="0" spcFirstLastPara="0" vertOverflow="overflow" horzOverflow="overflow" vert="horz" wrap="square" lIns="91440" tIns="45720" rIns="91440" bIns="45720" numCol="1" spcCol="0" rtlCol="0" fromWordArt="0" anchor="ctr" anchorCtr="0" forceAA="0" compatLnSpc="1">
+                <a:prstTxWarp prst="textNoShape">
+                  <a:avLst/>
+                </a:prstTxWarp>
+                <a:noAutofit/>
+              </a:bodyPr>
+              <a:lstStyle/>
+              <a:p>
+                <a:pPr algn="ctr"/>
+                <a:endParaRPr lang="en-US"/>
+              </a:p>
+            </p:txBody>
+          </p:sp>
+          <p:sp>
+            <p:nvSpPr>
+              <p:cNvPr id="13" name="TextBox 12"/>
+              <p:cNvSpPr txBox="1"/>
+              <p:nvPr/>
+            </p:nvSpPr>
+            <p:spPr>
+              <a:xfrm>
+                <a:off x="1060866" y="3396734"/>
+                <a:ext cx="850068" cy="422094"/>
+              </a:xfrm>
+              <a:prstGeom prst="rect">
+                <a:avLst/>
+              </a:prstGeom>
+              <a:noFill/>
+            </p:spPr>
+            <p:txBody>
+              <a:bodyPr wrap="square" rtlCol="0">
+                <a:spAutoFit/>
+              </a:bodyPr>
+              <a:lstStyle/>
+              <a:p>
+                <a:pPr algn="ctr"/>
+                <a:r>
+                  <a:rPr lang="en-US" dirty="0" smtClean="0"/>
+                  <a:t>Image</a:t>
+                </a:r>
+                <a:endParaRPr lang="en-US" dirty="0"/>
+              </a:p>
+            </p:txBody>
+          </p:sp>
+        </p:grpSp>
+        <p:grpSp>
+          <p:nvGrpSpPr>
+            <p:cNvPr id="18" name="Group 17"/>
+            <p:cNvGrpSpPr/>
+            <p:nvPr/>
+          </p:nvGrpSpPr>
+          <p:grpSpPr>
+            <a:xfrm>
+              <a:off x="2654300" y="2667000"/>
+              <a:ext cx="1828800" cy="1828800"/>
+              <a:chOff x="2658881" y="2667000"/>
+              <a:chExt cx="1828800" cy="1828800"/>
+            </a:xfrm>
+          </p:grpSpPr>
+          <p:sp>
+            <p:nvSpPr>
+              <p:cNvPr id="12" name="Rectangle 11"/>
+              <p:cNvSpPr/>
+              <p:nvPr/>
+            </p:nvSpPr>
+            <p:spPr>
+              <a:xfrm>
+                <a:off x="2658881" y="2667000"/>
+                <a:ext cx="1828800" cy="1828800"/>
+              </a:xfrm>
+              <a:prstGeom prst="rect">
+                <a:avLst/>
+              </a:prstGeom>
+              <a:solidFill>
+                <a:schemeClr val="accent1">
+                  <a:alpha val="10000"/>
+                </a:schemeClr>
+              </a:solidFill>
+              <a:ln>
+                <a:noFill/>
+              </a:ln>
+            </p:spPr>
+            <p:style>
+              <a:lnRef idx="2">
+                <a:schemeClr val="accent1">
+                  <a:shade val="50000"/>
+                </a:schemeClr>
+              </a:lnRef>
+              <a:fillRef idx="1">
+                <a:schemeClr val="accent1"/>
+              </a:fillRef>
+              <a:effectRef idx="0">
+                <a:schemeClr val="accent1"/>
+              </a:effectRef>
+              <a:fontRef idx="minor">
+                <a:schemeClr val="lt1"/>
+              </a:fontRef>
+            </p:style>
+            <p:txBody>
+              <a:bodyPr rot="0" spcFirstLastPara="0" vertOverflow="overflow" horzOverflow="overflow" vert="horz" wrap="square" lIns="91440" tIns="45720" rIns="91440" bIns="45720" numCol="1" spcCol="0" rtlCol="0" fromWordArt="0" anchor="ctr" anchorCtr="0" forceAA="0" compatLnSpc="1">
+                <a:prstTxWarp prst="textNoShape">
+                  <a:avLst/>
+                </a:prstTxWarp>
+                <a:noAutofit/>
+              </a:bodyPr>
+              <a:lstStyle/>
+              <a:p>
+                <a:pPr algn="ctr"/>
+                <a:endParaRPr lang="en-US"/>
+              </a:p>
+            </p:txBody>
+          </p:sp>
+          <p:sp>
+            <p:nvSpPr>
+              <p:cNvPr id="14" name="Rectangle 13"/>
+              <p:cNvSpPr/>
+              <p:nvPr/>
+            </p:nvSpPr>
+            <p:spPr>
+              <a:xfrm>
+                <a:off x="3184192" y="3396734"/>
+                <a:ext cx="778177" cy="422094"/>
+              </a:xfrm>
+              <a:prstGeom prst="rect">
+                <a:avLst/>
+              </a:prstGeom>
+            </p:spPr>
+            <p:txBody>
+              <a:bodyPr wrap="none">
+                <a:spAutoFit/>
+              </a:bodyPr>
+              <a:lstStyle/>
+              <a:p>
+                <a:pPr algn="ctr"/>
+                <a:r>
+                  <a:rPr lang="en-US" dirty="0"/>
+                  <a:t>Image</a:t>
+                </a:r>
+              </a:p>
+            </p:txBody>
+          </p:sp>
+        </p:grpSp>
+        <p:grpSp>
+          <p:nvGrpSpPr>
+            <p:cNvPr id="20" name="Group 19"/>
+            <p:cNvGrpSpPr/>
+            <p:nvPr/>
+          </p:nvGrpSpPr>
+          <p:grpSpPr>
+            <a:xfrm>
+              <a:off x="4737100" y="2667000"/>
+              <a:ext cx="1828800" cy="1828800"/>
+              <a:chOff x="2658881" y="2667000"/>
+              <a:chExt cx="1828800" cy="1828800"/>
+            </a:xfrm>
+          </p:grpSpPr>
+          <p:sp>
+            <p:nvSpPr>
+              <p:cNvPr id="21" name="Rectangle 20"/>
+              <p:cNvSpPr/>
+              <p:nvPr/>
+            </p:nvSpPr>
+            <p:spPr>
+              <a:xfrm>
+                <a:off x="2658881" y="2667000"/>
+                <a:ext cx="1828800" cy="1828800"/>
+              </a:xfrm>
+              <a:prstGeom prst="rect">
+                <a:avLst/>
+              </a:prstGeom>
+              <a:solidFill>
+                <a:schemeClr val="accent1">
+                  <a:alpha val="10000"/>
+                </a:schemeClr>
+              </a:solidFill>
+              <a:ln>
+                <a:noFill/>
+              </a:ln>
+            </p:spPr>
+            <p:style>
+              <a:lnRef idx="2">
+                <a:schemeClr val="accent1">
+                  <a:shade val="50000"/>
+                </a:schemeClr>
+              </a:lnRef>
+              <a:fillRef idx="1">
+                <a:schemeClr val="accent1"/>
+              </a:fillRef>
+              <a:effectRef idx="0">
+                <a:schemeClr val="accent1"/>
+              </a:effectRef>
+              <a:fontRef idx="minor">
+                <a:schemeClr val="lt1"/>
+              </a:fontRef>
+            </p:style>
+            <p:txBody>
+              <a:bodyPr rot="0" spcFirstLastPara="0" vertOverflow="overflow" horzOverflow="overflow" vert="horz" wrap="square" lIns="91440" tIns="45720" rIns="91440" bIns="45720" numCol="1" spcCol="0" rtlCol="0" fromWordArt="0" anchor="ctr" anchorCtr="0" forceAA="0" compatLnSpc="1">
+                <a:prstTxWarp prst="textNoShape">
+                  <a:avLst/>
+                </a:prstTxWarp>
+                <a:noAutofit/>
+              </a:bodyPr>
+              <a:lstStyle/>
+              <a:p>
+                <a:pPr algn="ctr"/>
+                <a:endParaRPr lang="en-US"/>
+              </a:p>
+            </p:txBody>
+          </p:sp>
+          <p:sp>
+            <p:nvSpPr>
+              <p:cNvPr id="22" name="Rectangle 21"/>
+              <p:cNvSpPr/>
+              <p:nvPr/>
+            </p:nvSpPr>
+            <p:spPr>
+              <a:xfrm>
+                <a:off x="3184192" y="3396734"/>
+                <a:ext cx="778177" cy="422094"/>
+              </a:xfrm>
+              <a:prstGeom prst="rect">
+                <a:avLst/>
+              </a:prstGeom>
+            </p:spPr>
+            <p:txBody>
+              <a:bodyPr wrap="none">
+                <a:spAutoFit/>
+              </a:bodyPr>
+              <a:lstStyle/>
+              <a:p>
+                <a:pPr algn="ctr"/>
+                <a:r>
+                  <a:rPr lang="en-US" dirty="0"/>
+                  <a:t>Image</a:t>
+                </a:r>
+              </a:p>
+            </p:txBody>
+          </p:sp>
+        </p:grpSp>
+        <p:grpSp>
+          <p:nvGrpSpPr>
+            <p:cNvPr id="23" name="Group 22"/>
+            <p:cNvGrpSpPr/>
+            <p:nvPr/>
+          </p:nvGrpSpPr>
+          <p:grpSpPr>
+            <a:xfrm>
+              <a:off x="6819900" y="2667000"/>
+              <a:ext cx="1828800" cy="1828800"/>
+              <a:chOff x="2658881" y="2667000"/>
+              <a:chExt cx="1828800" cy="1828800"/>
+            </a:xfrm>
+          </p:grpSpPr>
+          <p:sp>
+            <p:nvSpPr>
+              <p:cNvPr id="24" name="Rectangle 23"/>
+              <p:cNvSpPr/>
+              <p:nvPr/>
+            </p:nvSpPr>
+            <p:spPr>
+              <a:xfrm>
+                <a:off x="2658881" y="2667000"/>
+                <a:ext cx="1828800" cy="1828800"/>
+              </a:xfrm>
+              <a:prstGeom prst="rect">
+                <a:avLst/>
+              </a:prstGeom>
+              <a:solidFill>
+                <a:schemeClr val="accent1">
+                  <a:alpha val="10000"/>
+                </a:schemeClr>
+              </a:solidFill>
+              <a:ln>
+                <a:noFill/>
+              </a:ln>
+            </p:spPr>
+            <p:style>
+              <a:lnRef idx="2">
+                <a:schemeClr val="accent1">
+                  <a:shade val="50000"/>
+                </a:schemeClr>
+              </a:lnRef>
+              <a:fillRef idx="1">
+                <a:schemeClr val="accent1"/>
+              </a:fillRef>
+              <a:effectRef idx="0">
+                <a:schemeClr val="accent1"/>
+              </a:effectRef>
+              <a:fontRef idx="minor">
+                <a:schemeClr val="lt1"/>
+              </a:fontRef>
+            </p:style>
+            <p:txBody>
+              <a:bodyPr rot="0" spcFirstLastPara="0" vertOverflow="overflow" horzOverflow="overflow" vert="horz" wrap="square" lIns="91440" tIns="45720" rIns="91440" bIns="45720" numCol="1" spcCol="0" rtlCol="0" fromWordArt="0" anchor="ctr" anchorCtr="0" forceAA="0" compatLnSpc="1">
+                <a:prstTxWarp prst="textNoShape">
+                  <a:avLst/>
+                </a:prstTxWarp>
+                <a:noAutofit/>
+              </a:bodyPr>
+              <a:lstStyle/>
+              <a:p>
+                <a:pPr algn="ctr"/>
+                <a:endParaRPr lang="en-US"/>
+              </a:p>
+            </p:txBody>
+          </p:sp>
+          <p:sp>
+            <p:nvSpPr>
+              <p:cNvPr id="25" name="Rectangle 24"/>
+              <p:cNvSpPr/>
+              <p:nvPr/>
+            </p:nvSpPr>
+            <p:spPr>
+              <a:xfrm>
+                <a:off x="3184192" y="3396734"/>
+                <a:ext cx="778177" cy="422094"/>
+              </a:xfrm>
+              <a:prstGeom prst="rect">
+                <a:avLst/>
+              </a:prstGeom>
+            </p:spPr>
+            <p:txBody>
+              <a:bodyPr wrap="none">
+                <a:spAutoFit/>
+              </a:bodyPr>
+              <a:lstStyle/>
+              <a:p>
+                <a:pPr algn="ctr"/>
+                <a:r>
+                  <a:rPr lang="en-US" dirty="0"/>
+                  <a:t>Image</a:t>
+                </a:r>
+              </a:p>
+            </p:txBody>
+          </p:sp>
+        </p:grpSp>
+      </p:grpSp>
+      <p:grpSp>
+        <p:nvGrpSpPr>
+          <p:cNvPr id="27" name="Group 26"/>
+          <p:cNvGrpSpPr/>
+          <p:nvPr/>
+        </p:nvGrpSpPr>
+        <p:grpSpPr>
+          <a:xfrm>
+            <a:off x="4779344" y="4648200"/>
+            <a:ext cx="3810000" cy="2885105"/>
+            <a:chOff x="4724400" y="2753695"/>
+            <a:chExt cx="3810000" cy="2885105"/>
+          </a:xfrm>
+        </p:grpSpPr>
+        <p:sp>
+          <p:nvSpPr>
+            <p:cNvPr id="28" name="TextBox 27"/>
+            <p:cNvSpPr txBox="1"/>
+            <p:nvPr/>
+          </p:nvSpPr>
+          <p:spPr>
+            <a:xfrm>
+              <a:off x="4762500" y="2753695"/>
+              <a:ext cx="3429000" cy="369332"/>
+            </a:xfrm>
+            <a:prstGeom prst="rect">
+              <a:avLst/>
+            </a:prstGeom>
+            <a:noFill/>
+          </p:spPr>
+          <p:txBody>
+            <a:bodyPr wrap="square" rtlCol="0">
+              <a:spAutoFit/>
+            </a:bodyPr>
+            <a:lstStyle/>
+            <a:p>
+              <a:r>
+                <a:rPr lang="en-US" dirty="0" smtClean="0"/>
+                <a:t>Chapter XX contents</a:t>
+              </a:r>
+              <a:endParaRPr lang="en-US" dirty="0"/>
+            </a:p>
+          </p:txBody>
+        </p:sp>
+        <p:sp>
+          <p:nvSpPr>
+            <p:cNvPr id="29" name="Rectangle 28"/>
+            <p:cNvSpPr/>
+            <p:nvPr/>
+          </p:nvSpPr>
+          <p:spPr>
+            <a:xfrm>
+              <a:off x="4724400" y="2753695"/>
+              <a:ext cx="3810000" cy="2885105"/>
+            </a:xfrm>
+            <a:prstGeom prst="rect">
+              <a:avLst/>
+            </a:prstGeom>
+            <a:solidFill>
+              <a:schemeClr val="accent1">
+                <a:alpha val="10000"/>
+              </a:schemeClr>
+            </a:solidFill>
+            <a:ln>
+              <a:noFill/>
+            </a:ln>
+          </p:spPr>
+          <p:style>
+            <a:lnRef idx="2">
+              <a:schemeClr val="accent1">
+                <a:shade val="50000"/>
+              </a:schemeClr>
+            </a:lnRef>
+            <a:fillRef idx="1">
+              <a:schemeClr val="accent1"/>
+            </a:fillRef>
+            <a:effectRef idx="0">
+              <a:schemeClr val="accent1"/>
+            </a:effectRef>
+            <a:fontRef idx="minor">
+              <a:schemeClr val="lt1"/>
+            </a:fontRef>
+          </p:style>
+          <p:txBody>
+            <a:bodyPr rtlCol="0" anchor="ctr"/>
+            <a:lstStyle/>
+            <a:p>
+              <a:pPr algn="ctr"/>
+              <a:endParaRPr lang="en-US"/>
+            </a:p>
+          </p:txBody>
+        </p:sp>
+      </p:grpSp>
+      <p:grpSp>
+        <p:nvGrpSpPr>
+          <p:cNvPr id="30" name="Group 29"/>
+          <p:cNvGrpSpPr/>
+          <p:nvPr/>
+        </p:nvGrpSpPr>
+        <p:grpSpPr>
+          <a:xfrm>
+            <a:off x="692150" y="4648200"/>
+            <a:ext cx="3924300" cy="903905"/>
+            <a:chOff x="685800" y="2753695"/>
+            <a:chExt cx="3924300" cy="903905"/>
+          </a:xfrm>
+        </p:grpSpPr>
+        <p:sp>
+          <p:nvSpPr>
+            <p:cNvPr id="31" name="TextBox 30"/>
+            <p:cNvSpPr txBox="1"/>
+            <p:nvPr/>
+          </p:nvSpPr>
+          <p:spPr>
+            <a:xfrm>
+              <a:off x="685800" y="2753695"/>
+              <a:ext cx="2590800" cy="369332"/>
+            </a:xfrm>
+            <a:prstGeom prst="rect">
+              <a:avLst/>
+            </a:prstGeom>
+            <a:noFill/>
+          </p:spPr>
+          <p:txBody>
+            <a:bodyPr wrap="square" rtlCol="0">
+              <a:spAutoFit/>
+            </a:bodyPr>
+            <a:lstStyle/>
+            <a:p>
+              <a:r>
+                <a:rPr lang="en-US" dirty="0" smtClean="0"/>
+                <a:t>Chapter XX prelude</a:t>
+              </a:r>
+              <a:endParaRPr lang="en-US" dirty="0"/>
+            </a:p>
+          </p:txBody>
+        </p:sp>
+        <p:sp>
+          <p:nvSpPr>
+            <p:cNvPr id="32" name="Rectangle 31"/>
+            <p:cNvSpPr/>
+            <p:nvPr/>
+          </p:nvSpPr>
+          <p:spPr>
+            <a:xfrm>
+              <a:off x="685800" y="2753695"/>
+              <a:ext cx="3924300" cy="903905"/>
+            </a:xfrm>
+            <a:prstGeom prst="rect">
+              <a:avLst/>
+            </a:prstGeom>
+            <a:solidFill>
+              <a:schemeClr val="accent1">
+                <a:alpha val="10000"/>
+              </a:schemeClr>
+            </a:solidFill>
+            <a:ln>
+              <a:noFill/>
+            </a:ln>
+          </p:spPr>
+          <p:style>
+            <a:lnRef idx="2">
+              <a:schemeClr val="accent1">
+                <a:shade val="50000"/>
+              </a:schemeClr>
+            </a:lnRef>
+            <a:fillRef idx="1">
+              <a:schemeClr val="accent1"/>
+            </a:fillRef>
+            <a:effectRef idx="0">
+              <a:schemeClr val="accent1"/>
+            </a:effectRef>
+            <a:fontRef idx="minor">
+              <a:schemeClr val="lt1"/>
+            </a:fontRef>
+          </p:style>
+          <p:txBody>
+            <a:bodyPr rot="0" spcFirstLastPara="0" vertOverflow="overflow" horzOverflow="overflow" vert="horz" wrap="square" lIns="91440" tIns="45720" rIns="91440" bIns="45720" numCol="1" spcCol="0" rtlCol="0" fromWordArt="0" anchor="ctr" anchorCtr="0" forceAA="0" compatLnSpc="1">
+              <a:prstTxWarp prst="textNoShape">
+                <a:avLst/>
+              </a:prstTxWarp>
+              <a:noAutofit/>
+            </a:bodyPr>
+            <a:lstStyle/>
+            <a:p>
+              <a:pPr algn="ctr"/>
+              <a:endParaRPr lang="en-US"/>
+            </a:p>
+          </p:txBody>
+        </p:sp>
+      </p:grpSp>
+    </p:spTree>
+    <p:extLst>
+      <p:ext uri="{BB962C8B-B14F-4D97-AF65-F5344CB8AC3E}">
+        <p14:creationId xmlns:p14="http://schemas.microsoft.com/office/powerpoint/2010/main" val="1281938795"/>
       </p:ext>
     </p:extLst>
   </p:cSld>

</xml_diff>